<commit_message>
Create figures for diversity, evenness, and richness
</commit_message>
<xml_diff>
--- a/GrunerLab_RWorkshop_PPT.pptx
+++ b/GrunerLab_RWorkshop_PPT.pptx
@@ -5,7 +5,7 @@
     <p:sldMasterId id="2147483648" r:id="rId1"/>
   </p:sldMasterIdLst>
   <p:notesMasterIdLst>
-    <p:notesMasterId r:id="rId40"/>
+    <p:notesMasterId r:id="rId43"/>
   </p:notesMasterIdLst>
   <p:sldIdLst>
     <p:sldId id="256" r:id="rId2"/>
@@ -35,17 +35,20 @@
     <p:sldId id="272" r:id="rId26"/>
     <p:sldId id="275" r:id="rId27"/>
     <p:sldId id="291" r:id="rId28"/>
-    <p:sldId id="276" r:id="rId29"/>
-    <p:sldId id="277" r:id="rId30"/>
-    <p:sldId id="278" r:id="rId31"/>
-    <p:sldId id="292" r:id="rId32"/>
-    <p:sldId id="279" r:id="rId33"/>
-    <p:sldId id="293" r:id="rId34"/>
-    <p:sldId id="281" r:id="rId35"/>
-    <p:sldId id="294" r:id="rId36"/>
-    <p:sldId id="295" r:id="rId37"/>
-    <p:sldId id="282" r:id="rId38"/>
-    <p:sldId id="296" r:id="rId39"/>
+    <p:sldId id="277" r:id="rId29"/>
+    <p:sldId id="278" r:id="rId30"/>
+    <p:sldId id="292" r:id="rId31"/>
+    <p:sldId id="279" r:id="rId32"/>
+    <p:sldId id="293" r:id="rId33"/>
+    <p:sldId id="281" r:id="rId34"/>
+    <p:sldId id="294" r:id="rId35"/>
+    <p:sldId id="295" r:id="rId36"/>
+    <p:sldId id="282" r:id="rId37"/>
+    <p:sldId id="296" r:id="rId38"/>
+    <p:sldId id="298" r:id="rId39"/>
+    <p:sldId id="297" r:id="rId40"/>
+    <p:sldId id="299" r:id="rId41"/>
+    <p:sldId id="300" r:id="rId42"/>
   </p:sldIdLst>
   <p:sldSz cx="12192000" cy="6858000"/>
   <p:notesSz cx="6858000" cy="9144000"/>
@@ -10045,7 +10048,13 @@
   <p:cSld>
     <p:spTree>
       <p:nvGrpSpPr>
-        <p:cNvPr id="1" name=""/>
+        <p:cNvPr id="1" name="">
+          <a:extLst>
+            <a:ext uri="{FF2B5EF4-FFF2-40B4-BE49-F238E27FC236}">
+              <a16:creationId xmlns:a16="http://schemas.microsoft.com/office/drawing/2014/main" id="{52C07EBB-BE71-5015-ACBD-A468AEA7E5C0}"/>
+            </a:ext>
+          </a:extLst>
+        </p:cNvPr>
         <p:cNvGrpSpPr/>
         <p:nvPr/>
       </p:nvGrpSpPr>
@@ -10057,54 +10066,21 @@
           <a:chExt cx="0" cy="0"/>
         </a:xfrm>
       </p:grpSpPr>
-      <p:sp>
-        <p:nvSpPr>
-          <p:cNvPr id="7" name="TextBox 6">
-            <a:extLst>
-              <a:ext uri="{FF2B5EF4-FFF2-40B4-BE49-F238E27FC236}">
-                <a16:creationId xmlns:a16="http://schemas.microsoft.com/office/drawing/2014/main" id="{CFA9604A-8273-3C05-B075-2E85F2B0167B}"/>
-              </a:ext>
-            </a:extLst>
-          </p:cNvPr>
-          <p:cNvSpPr txBox="1"/>
-          <p:nvPr/>
-        </p:nvSpPr>
-        <p:spPr>
-          <a:xfrm>
-            <a:off x="8377083" y="5383161"/>
-            <a:ext cx="1135626" cy="307777"/>
-          </a:xfrm>
-          <a:prstGeom prst="rect">
-            <a:avLst/>
-          </a:prstGeom>
-          <a:noFill/>
-        </p:spPr>
-        <p:txBody>
-          <a:bodyPr wrap="square" rtlCol="0">
-            <a:spAutoFit/>
-          </a:bodyPr>
-          <a:lstStyle/>
-          <a:p>
-            <a:r>
-              <a:rPr lang="en-US" sz="1400" dirty="0"/>
-              <a:t>(Binary)</a:t>
-            </a:r>
-          </a:p>
-        </p:txBody>
-      </p:sp>
       <p:pic>
         <p:nvPicPr>
-          <p:cNvPr id="10" name="Content Placeholder 4" descr="A table with text on it&#10;&#10;Description automatically generated">
-            <a:extLst>
-              <a:ext uri="{FF2B5EF4-FFF2-40B4-BE49-F238E27FC236}">
-                <a16:creationId xmlns:a16="http://schemas.microsoft.com/office/drawing/2014/main" id="{C36F9B78-F7F2-E6D5-CA93-CC5AC6DB5BB6}"/>
+          <p:cNvPr id="5" name="Content Placeholder 4" descr="A table with text on it&#10;&#10;Description automatically generated">
+            <a:extLst>
+              <a:ext uri="{FF2B5EF4-FFF2-40B4-BE49-F238E27FC236}">
+                <a16:creationId xmlns:a16="http://schemas.microsoft.com/office/drawing/2014/main" id="{E0C71F12-6FC9-3913-69DB-2FB6CE098258}"/>
               </a:ext>
             </a:extLst>
           </p:cNvPr>
           <p:cNvPicPr>
-            <a:picLocks noChangeAspect="1"/>
+            <a:picLocks noGrp="1" noChangeAspect="1"/>
           </p:cNvPicPr>
-          <p:nvPr/>
+          <p:nvPr>
+            <p:ph idx="1"/>
+          </p:nvPr>
         </p:nvPicPr>
         <p:blipFill>
           <a:blip r:embed="rId2"/>
@@ -10116,17 +10092,14 @@
             <a:off x="6028562" y="1828755"/>
             <a:ext cx="5832667" cy="4926776"/>
           </a:xfrm>
-          <a:prstGeom prst="rect">
-            <a:avLst/>
-          </a:prstGeom>
         </p:spPr>
       </p:pic>
       <p:pic>
         <p:nvPicPr>
-          <p:cNvPr id="11" name="Picture 10" descr="A diagram of a question&#10;&#10;Description automatically generated">
-            <a:extLst>
-              <a:ext uri="{FF2B5EF4-FFF2-40B4-BE49-F238E27FC236}">
-                <a16:creationId xmlns:a16="http://schemas.microsoft.com/office/drawing/2014/main" id="{FF152767-0597-7D8B-A8E8-3894FC3C92A6}"/>
+          <p:cNvPr id="6" name="Picture 5" descr="A diagram of a question&#10;&#10;Description automatically generated">
+            <a:extLst>
+              <a:ext uri="{FF2B5EF4-FFF2-40B4-BE49-F238E27FC236}">
+                <a16:creationId xmlns:a16="http://schemas.microsoft.com/office/drawing/2014/main" id="{BA1F253D-C353-1754-4F27-AA36E1EF388E}"/>
               </a:ext>
             </a:extLst>
           </p:cNvPr>
@@ -10151,10 +10124,88 @@
           </a:prstGeom>
         </p:spPr>
       </p:pic>
+      <p:sp>
+        <p:nvSpPr>
+          <p:cNvPr id="7" name="TextBox 6">
+            <a:extLst>
+              <a:ext uri="{FF2B5EF4-FFF2-40B4-BE49-F238E27FC236}">
+                <a16:creationId xmlns:a16="http://schemas.microsoft.com/office/drawing/2014/main" id="{2B6415D7-CD01-511C-9F33-AB98686EC033}"/>
+              </a:ext>
+            </a:extLst>
+          </p:cNvPr>
+          <p:cNvSpPr txBox="1"/>
+          <p:nvPr/>
+        </p:nvSpPr>
+        <p:spPr>
+          <a:xfrm>
+            <a:off x="8377083" y="5383161"/>
+            <a:ext cx="1135626" cy="307777"/>
+          </a:xfrm>
+          <a:prstGeom prst="rect">
+            <a:avLst/>
+          </a:prstGeom>
+          <a:noFill/>
+        </p:spPr>
+        <p:txBody>
+          <a:bodyPr wrap="square" rtlCol="0">
+            <a:spAutoFit/>
+          </a:bodyPr>
+          <a:lstStyle/>
+          <a:p>
+            <a:r>
+              <a:rPr lang="en-US" sz="1400" dirty="0"/>
+              <a:t>(Binary)</a:t>
+            </a:r>
+          </a:p>
+        </p:txBody>
+      </p:sp>
+      <p:sp>
+        <p:nvSpPr>
+          <p:cNvPr id="2" name="Title 1">
+            <a:extLst>
+              <a:ext uri="{FF2B5EF4-FFF2-40B4-BE49-F238E27FC236}">
+                <a16:creationId xmlns:a16="http://schemas.microsoft.com/office/drawing/2014/main" id="{5E932552-3402-95F7-C427-7016EC68B6B3}"/>
+              </a:ext>
+            </a:extLst>
+          </p:cNvPr>
+          <p:cNvSpPr>
+            <a:spLocks noGrp="1"/>
+          </p:cNvSpPr>
+          <p:nvPr>
+            <p:ph type="title"/>
+          </p:nvPr>
+        </p:nvSpPr>
+        <p:spPr>
+          <a:xfrm>
+            <a:off x="838200" y="365125"/>
+            <a:ext cx="10515600" cy="1325563"/>
+          </a:xfrm>
+        </p:spPr>
+        <p:txBody>
+          <a:bodyPr>
+            <a:normAutofit/>
+          </a:bodyPr>
+          <a:lstStyle/>
+          <a:p>
+            <a:r>
+              <a:rPr lang="en-US" dirty="0"/>
+              <a:t>Apply this to our questions: </a:t>
+            </a:r>
+            <a:br>
+              <a:rPr lang="en-US" dirty="0"/>
+            </a:br>
+            <a:r>
+              <a:rPr lang="en-US" sz="3100" dirty="0"/>
+              <a:t>Does the arthropod community change with grazing intensity?</a:t>
+            </a:r>
+            <a:endParaRPr lang="en-US" dirty="0"/>
+          </a:p>
+        </p:txBody>
+      </p:sp>
     </p:spTree>
     <p:extLst>
       <p:ext uri="{BB962C8B-B14F-4D97-AF65-F5344CB8AC3E}">
-        <p14:creationId xmlns:p14="http://schemas.microsoft.com/office/powerpoint/2010/main" val="3450277869"/>
+        <p14:creationId xmlns:p14="http://schemas.microsoft.com/office/powerpoint/2010/main" val="2223334932"/>
       </p:ext>
     </p:extLst>
   </p:cSld>
@@ -10172,7 +10223,7 @@
         <p:cNvPr id="1" name="">
           <a:extLst>
             <a:ext uri="{FF2B5EF4-FFF2-40B4-BE49-F238E27FC236}">
-              <a16:creationId xmlns:a16="http://schemas.microsoft.com/office/drawing/2014/main" id="{52C07EBB-BE71-5015-ACBD-A468AEA7E5C0}"/>
+              <a16:creationId xmlns:a16="http://schemas.microsoft.com/office/drawing/2014/main" id="{24CF3CE9-4F18-7921-EAD0-A5912534FF19}"/>
             </a:ext>
           </a:extLst>
         </p:cNvPr>
@@ -10189,38 +10240,10 @@
       </p:grpSpPr>
       <p:pic>
         <p:nvPicPr>
-          <p:cNvPr id="5" name="Content Placeholder 4" descr="A table with text on it&#10;&#10;Description automatically generated">
-            <a:extLst>
-              <a:ext uri="{FF2B5EF4-FFF2-40B4-BE49-F238E27FC236}">
-                <a16:creationId xmlns:a16="http://schemas.microsoft.com/office/drawing/2014/main" id="{E0C71F12-6FC9-3913-69DB-2FB6CE098258}"/>
-              </a:ext>
-            </a:extLst>
-          </p:cNvPr>
-          <p:cNvPicPr>
-            <a:picLocks noGrp="1" noChangeAspect="1"/>
-          </p:cNvPicPr>
-          <p:nvPr>
-            <p:ph idx="1"/>
-          </p:nvPr>
-        </p:nvPicPr>
-        <p:blipFill>
-          <a:blip r:embed="rId2"/>
-          <a:srcRect l="18438" t="5776" r="14895"/>
-          <a:stretch/>
-        </p:blipFill>
-        <p:spPr>
-          <a:xfrm>
-            <a:off x="6028562" y="1828755"/>
-            <a:ext cx="5832667" cy="4926776"/>
-          </a:xfrm>
-        </p:spPr>
-      </p:pic>
-      <p:pic>
-        <p:nvPicPr>
           <p:cNvPr id="6" name="Picture 5" descr="A diagram of a question&#10;&#10;Description automatically generated">
             <a:extLst>
               <a:ext uri="{FF2B5EF4-FFF2-40B4-BE49-F238E27FC236}">
-                <a16:creationId xmlns:a16="http://schemas.microsoft.com/office/drawing/2014/main" id="{BA1F253D-C353-1754-4F27-AA36E1EF388E}"/>
+                <a16:creationId xmlns:a16="http://schemas.microsoft.com/office/drawing/2014/main" id="{FBF929FE-E222-1AB8-1732-FA6B2B92B52B}"/>
               </a:ext>
             </a:extLst>
           </p:cNvPr>
@@ -10230,15 +10253,15 @@
           <p:nvPr/>
         </p:nvPicPr>
         <p:blipFill>
-          <a:blip r:embed="rId3"/>
+          <a:blip r:embed="rId2"/>
           <a:stretch>
             <a:fillRect/>
           </a:stretch>
         </p:blipFill>
         <p:spPr>
           <a:xfrm>
-            <a:off x="0" y="2700392"/>
-            <a:ext cx="6028562" cy="2990546"/>
+            <a:off x="1955452" y="1790992"/>
+            <a:ext cx="8281095" cy="4107944"/>
           </a:xfrm>
           <a:prstGeom prst="rect">
             <a:avLst/>
@@ -10247,10 +10270,105 @@
       </p:pic>
       <p:sp>
         <p:nvSpPr>
-          <p:cNvPr id="7" name="TextBox 6">
-            <a:extLst>
-              <a:ext uri="{FF2B5EF4-FFF2-40B4-BE49-F238E27FC236}">
-                <a16:creationId xmlns:a16="http://schemas.microsoft.com/office/drawing/2014/main" id="{2B6415D7-CD01-511C-9F33-AB98686EC033}"/>
+          <p:cNvPr id="2" name="Title 1">
+            <a:extLst>
+              <a:ext uri="{FF2B5EF4-FFF2-40B4-BE49-F238E27FC236}">
+                <a16:creationId xmlns:a16="http://schemas.microsoft.com/office/drawing/2014/main" id="{732CBA96-2926-7243-EA17-E039BC4D0C35}"/>
+              </a:ext>
+            </a:extLst>
+          </p:cNvPr>
+          <p:cNvSpPr>
+            <a:spLocks noGrp="1"/>
+          </p:cNvSpPr>
+          <p:nvPr>
+            <p:ph type="title"/>
+          </p:nvPr>
+        </p:nvSpPr>
+        <p:spPr>
+          <a:xfrm>
+            <a:off x="838200" y="365125"/>
+            <a:ext cx="10515600" cy="1325563"/>
+          </a:xfrm>
+        </p:spPr>
+        <p:txBody>
+          <a:bodyPr>
+            <a:normAutofit/>
+          </a:bodyPr>
+          <a:lstStyle/>
+          <a:p>
+            <a:r>
+              <a:rPr lang="en-US" dirty="0"/>
+              <a:t>Apply this to our questions: </a:t>
+            </a:r>
+            <a:br>
+              <a:rPr lang="en-US" dirty="0"/>
+            </a:br>
+            <a:r>
+              <a:rPr lang="en-US" sz="3100" dirty="0"/>
+              <a:t>Does the arthropod community change with grazing intensity?</a:t>
+            </a:r>
+            <a:endParaRPr lang="en-US" dirty="0"/>
+          </a:p>
+        </p:txBody>
+      </p:sp>
+      <p:sp>
+        <p:nvSpPr>
+          <p:cNvPr id="3" name="Rectangle 2">
+            <a:extLst>
+              <a:ext uri="{FF2B5EF4-FFF2-40B4-BE49-F238E27FC236}">
+                <a16:creationId xmlns:a16="http://schemas.microsoft.com/office/drawing/2014/main" id="{30DB04BD-CA8D-796F-13CC-AA5B6FB75856}"/>
+              </a:ext>
+            </a:extLst>
+          </p:cNvPr>
+          <p:cNvSpPr/>
+          <p:nvPr/>
+        </p:nvSpPr>
+        <p:spPr>
+          <a:xfrm>
+            <a:off x="2128685" y="3200402"/>
+            <a:ext cx="3259392" cy="737420"/>
+          </a:xfrm>
+          <a:prstGeom prst="rect">
+            <a:avLst/>
+          </a:prstGeom>
+          <a:noFill/>
+          <a:ln w="28575">
+            <a:solidFill>
+              <a:srgbClr val="FF0000"/>
+            </a:solidFill>
+          </a:ln>
+        </p:spPr>
+        <p:style>
+          <a:lnRef idx="2">
+            <a:schemeClr val="accent1">
+              <a:shade val="15000"/>
+            </a:schemeClr>
+          </a:lnRef>
+          <a:fillRef idx="1">
+            <a:schemeClr val="accent1"/>
+          </a:fillRef>
+          <a:effectRef idx="0">
+            <a:schemeClr val="accent1"/>
+          </a:effectRef>
+          <a:fontRef idx="minor">
+            <a:schemeClr val="lt1"/>
+          </a:fontRef>
+        </p:style>
+        <p:txBody>
+          <a:bodyPr rtlCol="0" anchor="ctr"/>
+          <a:lstStyle/>
+          <a:p>
+            <a:pPr algn="ctr"/>
+            <a:endParaRPr lang="en-US"/>
+          </a:p>
+        </p:txBody>
+      </p:sp>
+      <p:sp>
+        <p:nvSpPr>
+          <p:cNvPr id="8" name="TextBox 7">
+            <a:extLst>
+              <a:ext uri="{FF2B5EF4-FFF2-40B4-BE49-F238E27FC236}">
+                <a16:creationId xmlns:a16="http://schemas.microsoft.com/office/drawing/2014/main" id="{CB40213A-77AD-29F0-D82E-729B5CFED455}"/>
               </a:ext>
             </a:extLst>
           </p:cNvPr>
@@ -10259,8 +10377,8 @@
         </p:nvSpPr>
         <p:spPr>
           <a:xfrm>
-            <a:off x="8377083" y="5383161"/>
-            <a:ext cx="1135626" cy="307777"/>
+            <a:off x="0" y="5939491"/>
+            <a:ext cx="6555658" cy="954107"/>
           </a:xfrm>
           <a:prstGeom prst="rect">
             <a:avLst/>
@@ -10274,59 +10392,74 @@
           <a:lstStyle/>
           <a:p>
             <a:r>
-              <a:rPr lang="en-US" sz="1400" dirty="0"/>
-              <a:t>(Binary)</a:t>
-            </a:r>
-          </a:p>
-        </p:txBody>
-      </p:sp>
-      <p:sp>
-        <p:nvSpPr>
-          <p:cNvPr id="2" name="Title 1">
-            <a:extLst>
-              <a:ext uri="{FF2B5EF4-FFF2-40B4-BE49-F238E27FC236}">
-                <a16:creationId xmlns:a16="http://schemas.microsoft.com/office/drawing/2014/main" id="{5E932552-3402-95F7-C427-7016EC68B6B3}"/>
-              </a:ext>
-            </a:extLst>
-          </p:cNvPr>
-          <p:cNvSpPr>
-            <a:spLocks noGrp="1"/>
-          </p:cNvSpPr>
-          <p:nvPr>
-            <p:ph type="title"/>
-          </p:nvPr>
+              <a:rPr lang="en-US" sz="2800" dirty="0"/>
+              <a:t>Our groups are:</a:t>
+            </a:r>
+          </a:p>
+          <a:p>
+            <a:r>
+              <a:rPr lang="en-US" sz="2800" dirty="0"/>
+              <a:t>high grazing, low grazing, and no grazing </a:t>
+            </a:r>
+          </a:p>
+        </p:txBody>
+      </p:sp>
+      <p:sp>
+        <p:nvSpPr>
+          <p:cNvPr id="9" name="Rectangle 8">
+            <a:extLst>
+              <a:ext uri="{FF2B5EF4-FFF2-40B4-BE49-F238E27FC236}">
+                <a16:creationId xmlns:a16="http://schemas.microsoft.com/office/drawing/2014/main" id="{1C1D7C4D-76D6-FCDD-B386-2D7F8EF6BBC2}"/>
+              </a:ext>
+            </a:extLst>
+          </p:cNvPr>
+          <p:cNvSpPr/>
+          <p:nvPr/>
         </p:nvSpPr>
         <p:spPr>
           <a:xfrm>
-            <a:off x="838200" y="365125"/>
-            <a:ext cx="10515600" cy="1325563"/>
+            <a:off x="4154131" y="4269165"/>
+            <a:ext cx="1593913" cy="1413879"/>
           </a:xfrm>
+          <a:prstGeom prst="rect">
+            <a:avLst/>
+          </a:prstGeom>
+          <a:noFill/>
+          <a:ln w="28575">
+            <a:solidFill>
+              <a:srgbClr val="FF0000"/>
+            </a:solidFill>
+          </a:ln>
         </p:spPr>
-        <p:txBody>
-          <a:bodyPr>
-            <a:normAutofit fontScale="90000"/>
-          </a:bodyPr>
-          <a:lstStyle/>
-          <a:p>
-            <a:r>
-              <a:rPr lang="en-US" dirty="0"/>
-              <a:t>Apply this to our questions: </a:t>
-            </a:r>
-            <a:br>
-              <a:rPr lang="en-US" dirty="0"/>
-            </a:br>
-            <a:r>
-              <a:rPr lang="en-US" sz="3100" dirty="0"/>
-              <a:t>How does the arthropod community change with grazing intensity?</a:t>
-            </a:r>
-            <a:endParaRPr lang="en-US" dirty="0"/>
+        <p:style>
+          <a:lnRef idx="2">
+            <a:schemeClr val="accent1">
+              <a:shade val="15000"/>
+            </a:schemeClr>
+          </a:lnRef>
+          <a:fillRef idx="1">
+            <a:schemeClr val="accent1"/>
+          </a:fillRef>
+          <a:effectRef idx="0">
+            <a:schemeClr val="accent1"/>
+          </a:effectRef>
+          <a:fontRef idx="minor">
+            <a:schemeClr val="lt1"/>
+          </a:fontRef>
+        </p:style>
+        <p:txBody>
+          <a:bodyPr rtlCol="0" anchor="ctr"/>
+          <a:lstStyle/>
+          <a:p>
+            <a:pPr algn="ctr"/>
+            <a:endParaRPr lang="en-US"/>
           </a:p>
         </p:txBody>
       </p:sp>
     </p:spTree>
     <p:extLst>
       <p:ext uri="{BB962C8B-B14F-4D97-AF65-F5344CB8AC3E}">
-        <p14:creationId xmlns:p14="http://schemas.microsoft.com/office/powerpoint/2010/main" val="2223334932"/>
+        <p14:creationId xmlns:p14="http://schemas.microsoft.com/office/powerpoint/2010/main" val="4073924205"/>
       </p:ext>
     </p:extLst>
   </p:cSld>
@@ -10535,375 +10668,6 @@
   <p:cSld>
     <p:spTree>
       <p:nvGrpSpPr>
-        <p:cNvPr id="1" name="">
-          <a:extLst>
-            <a:ext uri="{FF2B5EF4-FFF2-40B4-BE49-F238E27FC236}">
-              <a16:creationId xmlns:a16="http://schemas.microsoft.com/office/drawing/2014/main" id="{24CF3CE9-4F18-7921-EAD0-A5912534FF19}"/>
-            </a:ext>
-          </a:extLst>
-        </p:cNvPr>
-        <p:cNvGrpSpPr/>
-        <p:nvPr/>
-      </p:nvGrpSpPr>
-      <p:grpSpPr>
-        <a:xfrm>
-          <a:off x="0" y="0"/>
-          <a:ext cx="0" cy="0"/>
-          <a:chOff x="0" y="0"/>
-          <a:chExt cx="0" cy="0"/>
-        </a:xfrm>
-      </p:grpSpPr>
-      <p:pic>
-        <p:nvPicPr>
-          <p:cNvPr id="5" name="Content Placeholder 4" descr="A table with text on it&#10;&#10;Description automatically generated">
-            <a:extLst>
-              <a:ext uri="{FF2B5EF4-FFF2-40B4-BE49-F238E27FC236}">
-                <a16:creationId xmlns:a16="http://schemas.microsoft.com/office/drawing/2014/main" id="{1B244CD7-5337-C8E6-D5AE-794610764F70}"/>
-              </a:ext>
-            </a:extLst>
-          </p:cNvPr>
-          <p:cNvPicPr>
-            <a:picLocks noGrp="1" noChangeAspect="1"/>
-          </p:cNvPicPr>
-          <p:nvPr>
-            <p:ph idx="1"/>
-          </p:nvPr>
-        </p:nvPicPr>
-        <p:blipFill>
-          <a:blip r:embed="rId2"/>
-          <a:srcRect l="18438" t="5776" r="14895"/>
-          <a:stretch/>
-        </p:blipFill>
-        <p:spPr>
-          <a:xfrm>
-            <a:off x="6028562" y="1828755"/>
-            <a:ext cx="5832667" cy="4926776"/>
-          </a:xfrm>
-        </p:spPr>
-      </p:pic>
-      <p:pic>
-        <p:nvPicPr>
-          <p:cNvPr id="6" name="Picture 5" descr="A diagram of a question&#10;&#10;Description automatically generated">
-            <a:extLst>
-              <a:ext uri="{FF2B5EF4-FFF2-40B4-BE49-F238E27FC236}">
-                <a16:creationId xmlns:a16="http://schemas.microsoft.com/office/drawing/2014/main" id="{FBF929FE-E222-1AB8-1732-FA6B2B92B52B}"/>
-              </a:ext>
-            </a:extLst>
-          </p:cNvPr>
-          <p:cNvPicPr>
-            <a:picLocks noChangeAspect="1"/>
-          </p:cNvPicPr>
-          <p:nvPr/>
-        </p:nvPicPr>
-        <p:blipFill>
-          <a:blip r:embed="rId3"/>
-          <a:stretch>
-            <a:fillRect/>
-          </a:stretch>
-        </p:blipFill>
-        <p:spPr>
-          <a:xfrm>
-            <a:off x="0" y="2700392"/>
-            <a:ext cx="6028562" cy="2990546"/>
-          </a:xfrm>
-          <a:prstGeom prst="rect">
-            <a:avLst/>
-          </a:prstGeom>
-        </p:spPr>
-      </p:pic>
-      <p:sp>
-        <p:nvSpPr>
-          <p:cNvPr id="7" name="TextBox 6">
-            <a:extLst>
-              <a:ext uri="{FF2B5EF4-FFF2-40B4-BE49-F238E27FC236}">
-                <a16:creationId xmlns:a16="http://schemas.microsoft.com/office/drawing/2014/main" id="{24535D4C-4A33-9D78-591D-199551460B95}"/>
-              </a:ext>
-            </a:extLst>
-          </p:cNvPr>
-          <p:cNvSpPr txBox="1"/>
-          <p:nvPr/>
-        </p:nvSpPr>
-        <p:spPr>
-          <a:xfrm>
-            <a:off x="8377083" y="5383161"/>
-            <a:ext cx="1135626" cy="307777"/>
-          </a:xfrm>
-          <a:prstGeom prst="rect">
-            <a:avLst/>
-          </a:prstGeom>
-          <a:noFill/>
-        </p:spPr>
-        <p:txBody>
-          <a:bodyPr wrap="square" rtlCol="0">
-            <a:spAutoFit/>
-          </a:bodyPr>
-          <a:lstStyle/>
-          <a:p>
-            <a:r>
-              <a:rPr lang="en-US" sz="1400" dirty="0"/>
-              <a:t>(Binary)</a:t>
-            </a:r>
-          </a:p>
-        </p:txBody>
-      </p:sp>
-      <p:sp>
-        <p:nvSpPr>
-          <p:cNvPr id="2" name="Title 1">
-            <a:extLst>
-              <a:ext uri="{FF2B5EF4-FFF2-40B4-BE49-F238E27FC236}">
-                <a16:creationId xmlns:a16="http://schemas.microsoft.com/office/drawing/2014/main" id="{732CBA96-2926-7243-EA17-E039BC4D0C35}"/>
-              </a:ext>
-            </a:extLst>
-          </p:cNvPr>
-          <p:cNvSpPr>
-            <a:spLocks noGrp="1"/>
-          </p:cNvSpPr>
-          <p:nvPr>
-            <p:ph type="title"/>
-          </p:nvPr>
-        </p:nvSpPr>
-        <p:spPr>
-          <a:xfrm>
-            <a:off x="838200" y="365125"/>
-            <a:ext cx="10515600" cy="1325563"/>
-          </a:xfrm>
-        </p:spPr>
-        <p:txBody>
-          <a:bodyPr>
-            <a:normAutofit fontScale="90000"/>
-          </a:bodyPr>
-          <a:lstStyle/>
-          <a:p>
-            <a:r>
-              <a:rPr lang="en-US" dirty="0"/>
-              <a:t>Apply this to our questions: </a:t>
-            </a:r>
-            <a:br>
-              <a:rPr lang="en-US" dirty="0"/>
-            </a:br>
-            <a:r>
-              <a:rPr lang="en-US" sz="3100" dirty="0"/>
-              <a:t>How does the arthropod community change with grazing intensity?</a:t>
-            </a:r>
-            <a:endParaRPr lang="en-US" dirty="0"/>
-          </a:p>
-        </p:txBody>
-      </p:sp>
-      <p:sp>
-        <p:nvSpPr>
-          <p:cNvPr id="3" name="Rectangle 2">
-            <a:extLst>
-              <a:ext uri="{FF2B5EF4-FFF2-40B4-BE49-F238E27FC236}">
-                <a16:creationId xmlns:a16="http://schemas.microsoft.com/office/drawing/2014/main" id="{30DB04BD-CA8D-796F-13CC-AA5B6FB75856}"/>
-              </a:ext>
-            </a:extLst>
-          </p:cNvPr>
-          <p:cNvSpPr/>
-          <p:nvPr/>
-        </p:nvSpPr>
-        <p:spPr>
-          <a:xfrm>
-            <a:off x="73743" y="3583860"/>
-            <a:ext cx="2462981" cy="737420"/>
-          </a:xfrm>
-          <a:prstGeom prst="rect">
-            <a:avLst/>
-          </a:prstGeom>
-          <a:noFill/>
-          <a:ln w="28575">
-            <a:solidFill>
-              <a:srgbClr val="FF0000"/>
-            </a:solidFill>
-          </a:ln>
-        </p:spPr>
-        <p:style>
-          <a:lnRef idx="2">
-            <a:schemeClr val="accent1">
-              <a:shade val="15000"/>
-            </a:schemeClr>
-          </a:lnRef>
-          <a:fillRef idx="1">
-            <a:schemeClr val="accent1"/>
-          </a:fillRef>
-          <a:effectRef idx="0">
-            <a:schemeClr val="accent1"/>
-          </a:effectRef>
-          <a:fontRef idx="minor">
-            <a:schemeClr val="lt1"/>
-          </a:fontRef>
-        </p:style>
-        <p:txBody>
-          <a:bodyPr rtlCol="0" anchor="ctr"/>
-          <a:lstStyle/>
-          <a:p>
-            <a:pPr algn="ctr"/>
-            <a:endParaRPr lang="en-US"/>
-          </a:p>
-        </p:txBody>
-      </p:sp>
-      <p:sp>
-        <p:nvSpPr>
-          <p:cNvPr id="4" name="Rectangle 3">
-            <a:extLst>
-              <a:ext uri="{FF2B5EF4-FFF2-40B4-BE49-F238E27FC236}">
-                <a16:creationId xmlns:a16="http://schemas.microsoft.com/office/drawing/2014/main" id="{10B611C0-8384-B138-6A1A-94DDF1C2F9D5}"/>
-              </a:ext>
-            </a:extLst>
-          </p:cNvPr>
-          <p:cNvSpPr/>
-          <p:nvPr/>
-        </p:nvSpPr>
-        <p:spPr>
-          <a:xfrm>
-            <a:off x="6163440" y="3219686"/>
-            <a:ext cx="5576276" cy="954108"/>
-          </a:xfrm>
-          <a:prstGeom prst="rect">
-            <a:avLst/>
-          </a:prstGeom>
-          <a:noFill/>
-          <a:ln w="28575">
-            <a:solidFill>
-              <a:srgbClr val="FF0000"/>
-            </a:solidFill>
-          </a:ln>
-        </p:spPr>
-        <p:style>
-          <a:lnRef idx="2">
-            <a:schemeClr val="accent1">
-              <a:shade val="15000"/>
-            </a:schemeClr>
-          </a:lnRef>
-          <a:fillRef idx="1">
-            <a:schemeClr val="accent1"/>
-          </a:fillRef>
-          <a:effectRef idx="0">
-            <a:schemeClr val="accent1"/>
-          </a:effectRef>
-          <a:fontRef idx="minor">
-            <a:schemeClr val="lt1"/>
-          </a:fontRef>
-        </p:style>
-        <p:txBody>
-          <a:bodyPr rtlCol="0" anchor="ctr"/>
-          <a:lstStyle/>
-          <a:p>
-            <a:pPr algn="ctr"/>
-            <a:endParaRPr lang="en-US"/>
-          </a:p>
-        </p:txBody>
-      </p:sp>
-      <p:sp>
-        <p:nvSpPr>
-          <p:cNvPr id="8" name="TextBox 7">
-            <a:extLst>
-              <a:ext uri="{FF2B5EF4-FFF2-40B4-BE49-F238E27FC236}">
-                <a16:creationId xmlns:a16="http://schemas.microsoft.com/office/drawing/2014/main" id="{CB40213A-77AD-29F0-D82E-729B5CFED455}"/>
-              </a:ext>
-            </a:extLst>
-          </p:cNvPr>
-          <p:cNvSpPr txBox="1"/>
-          <p:nvPr/>
-        </p:nvSpPr>
-        <p:spPr>
-          <a:xfrm>
-            <a:off x="0" y="5939491"/>
-            <a:ext cx="6555658" cy="954107"/>
-          </a:xfrm>
-          <a:prstGeom prst="rect">
-            <a:avLst/>
-          </a:prstGeom>
-          <a:noFill/>
-        </p:spPr>
-        <p:txBody>
-          <a:bodyPr wrap="square" rtlCol="0">
-            <a:spAutoFit/>
-          </a:bodyPr>
-          <a:lstStyle/>
-          <a:p>
-            <a:r>
-              <a:rPr lang="en-US" sz="2800" dirty="0"/>
-              <a:t>Our groups are:</a:t>
-            </a:r>
-          </a:p>
-          <a:p>
-            <a:r>
-              <a:rPr lang="en-US" sz="2800" dirty="0"/>
-              <a:t>high grazing, low grazing, and no grazing </a:t>
-            </a:r>
-          </a:p>
-        </p:txBody>
-      </p:sp>
-      <p:sp>
-        <p:nvSpPr>
-          <p:cNvPr id="9" name="Rectangle 8">
-            <a:extLst>
-              <a:ext uri="{FF2B5EF4-FFF2-40B4-BE49-F238E27FC236}">
-                <a16:creationId xmlns:a16="http://schemas.microsoft.com/office/drawing/2014/main" id="{1C1D7C4D-76D6-FCDD-B386-2D7F8EF6BBC2}"/>
-              </a:ext>
-            </a:extLst>
-          </p:cNvPr>
-          <p:cNvSpPr/>
-          <p:nvPr/>
-        </p:nvSpPr>
-        <p:spPr>
-          <a:xfrm>
-            <a:off x="1568247" y="4467328"/>
-            <a:ext cx="1204451" cy="1078066"/>
-          </a:xfrm>
-          <a:prstGeom prst="rect">
-            <a:avLst/>
-          </a:prstGeom>
-          <a:noFill/>
-          <a:ln w="28575">
-            <a:solidFill>
-              <a:srgbClr val="FF0000"/>
-            </a:solidFill>
-          </a:ln>
-        </p:spPr>
-        <p:style>
-          <a:lnRef idx="2">
-            <a:schemeClr val="accent1">
-              <a:shade val="15000"/>
-            </a:schemeClr>
-          </a:lnRef>
-          <a:fillRef idx="1">
-            <a:schemeClr val="accent1"/>
-          </a:fillRef>
-          <a:effectRef idx="0">
-            <a:schemeClr val="accent1"/>
-          </a:effectRef>
-          <a:fontRef idx="minor">
-            <a:schemeClr val="lt1"/>
-          </a:fontRef>
-        </p:style>
-        <p:txBody>
-          <a:bodyPr rtlCol="0" anchor="ctr"/>
-          <a:lstStyle/>
-          <a:p>
-            <a:pPr algn="ctr"/>
-            <a:endParaRPr lang="en-US"/>
-          </a:p>
-        </p:txBody>
-      </p:sp>
-    </p:spTree>
-    <p:extLst>
-      <p:ext uri="{BB962C8B-B14F-4D97-AF65-F5344CB8AC3E}">
-        <p14:creationId xmlns:p14="http://schemas.microsoft.com/office/powerpoint/2010/main" val="4073924205"/>
-      </p:ext>
-    </p:extLst>
-  </p:cSld>
-  <p:clrMapOvr>
-    <a:masterClrMapping/>
-  </p:clrMapOvr>
-</p:sld>
-</file>
-
-<file path=ppt/slides/slide31.xml><?xml version="1.0" encoding="utf-8"?>
-<p:sld xmlns:a="http://schemas.openxmlformats.org/drawingml/2006/main" xmlns:r="http://schemas.openxmlformats.org/officeDocument/2006/relationships" xmlns:p="http://schemas.openxmlformats.org/presentationml/2006/main">
-  <p:cSld>
-    <p:spTree>
-      <p:nvGrpSpPr>
         <p:cNvPr id="1" name=""/>
         <p:cNvGrpSpPr/>
         <p:nvPr/>
@@ -11021,7 +10785,7 @@
 </p:sld>
 </file>
 
-<file path=ppt/slides/slide32.xml><?xml version="1.0" encoding="utf-8"?>
+<file path=ppt/slides/slide31.xml><?xml version="1.0" encoding="utf-8"?>
 <p:sld xmlns:a="http://schemas.openxmlformats.org/drawingml/2006/main" xmlns:r="http://schemas.openxmlformats.org/officeDocument/2006/relationships" xmlns:p="http://schemas.openxmlformats.org/presentationml/2006/main">
   <p:cSld>
     <p:spTree>
@@ -11046,38 +10810,10 @@
       </p:grpSpPr>
       <p:pic>
         <p:nvPicPr>
-          <p:cNvPr id="5" name="Content Placeholder 4" descr="A table with text on it&#10;&#10;Description automatically generated">
-            <a:extLst>
-              <a:ext uri="{FF2B5EF4-FFF2-40B4-BE49-F238E27FC236}">
-                <a16:creationId xmlns:a16="http://schemas.microsoft.com/office/drawing/2014/main" id="{B2D6A3E4-0310-35BD-768B-945E15574236}"/>
-              </a:ext>
-            </a:extLst>
-          </p:cNvPr>
-          <p:cNvPicPr>
-            <a:picLocks noGrp="1" noChangeAspect="1"/>
-          </p:cNvPicPr>
-          <p:nvPr>
-            <p:ph idx="1"/>
-          </p:nvPr>
-        </p:nvPicPr>
-        <p:blipFill>
-          <a:blip r:embed="rId2"/>
-          <a:srcRect l="18438" t="5776" r="14895"/>
-          <a:stretch/>
-        </p:blipFill>
-        <p:spPr>
-          <a:xfrm>
-            <a:off x="6028562" y="1828755"/>
-            <a:ext cx="5832667" cy="4926776"/>
-          </a:xfrm>
-        </p:spPr>
-      </p:pic>
-      <p:pic>
-        <p:nvPicPr>
-          <p:cNvPr id="6" name="Picture 5" descr="A diagram of a question&#10;&#10;Description automatically generated">
-            <a:extLst>
-              <a:ext uri="{FF2B5EF4-FFF2-40B4-BE49-F238E27FC236}">
-                <a16:creationId xmlns:a16="http://schemas.microsoft.com/office/drawing/2014/main" id="{DDB6AED5-1801-7EA1-85A8-D4D541B91F78}"/>
+          <p:cNvPr id="15" name="Picture 14" descr="A diagram of a question&#10;&#10;Description automatically generated">
+            <a:extLst>
+              <a:ext uri="{FF2B5EF4-FFF2-40B4-BE49-F238E27FC236}">
+                <a16:creationId xmlns:a16="http://schemas.microsoft.com/office/drawing/2014/main" id="{6DE1525D-EAE9-ECE2-3B97-F7B7E8FF3ADD}"/>
               </a:ext>
             </a:extLst>
           </p:cNvPr>
@@ -11087,15 +10823,15 @@
           <p:nvPr/>
         </p:nvPicPr>
         <p:blipFill>
-          <a:blip r:embed="rId3"/>
+          <a:blip r:embed="rId2"/>
           <a:stretch>
             <a:fillRect/>
           </a:stretch>
         </p:blipFill>
         <p:spPr>
           <a:xfrm>
-            <a:off x="0" y="2700392"/>
-            <a:ext cx="6028562" cy="2990546"/>
+            <a:off x="4199124" y="2411753"/>
+            <a:ext cx="7885471" cy="3911690"/>
           </a:xfrm>
           <a:prstGeom prst="rect">
             <a:avLst/>
@@ -11104,179 +10840,20 @@
       </p:pic>
       <p:sp>
         <p:nvSpPr>
-          <p:cNvPr id="7" name="TextBox 6">
-            <a:extLst>
-              <a:ext uri="{FF2B5EF4-FFF2-40B4-BE49-F238E27FC236}">
-                <a16:creationId xmlns:a16="http://schemas.microsoft.com/office/drawing/2014/main" id="{F69EA43B-C423-1BEC-6BEC-2C8936975836}"/>
-              </a:ext>
-            </a:extLst>
-          </p:cNvPr>
-          <p:cNvSpPr txBox="1"/>
+          <p:cNvPr id="16" name="Rectangle 15">
+            <a:extLst>
+              <a:ext uri="{FF2B5EF4-FFF2-40B4-BE49-F238E27FC236}">
+                <a16:creationId xmlns:a16="http://schemas.microsoft.com/office/drawing/2014/main" id="{D69E877C-EDC2-9661-AA1D-98818D90F90A}"/>
+              </a:ext>
+            </a:extLst>
+          </p:cNvPr>
+          <p:cNvSpPr/>
           <p:nvPr/>
         </p:nvSpPr>
         <p:spPr>
           <a:xfrm>
-            <a:off x="8377083" y="5383161"/>
-            <a:ext cx="1135626" cy="307777"/>
-          </a:xfrm>
-          <a:prstGeom prst="rect">
-            <a:avLst/>
-          </a:prstGeom>
-          <a:noFill/>
-        </p:spPr>
-        <p:txBody>
-          <a:bodyPr wrap="square" rtlCol="0">
-            <a:spAutoFit/>
-          </a:bodyPr>
-          <a:lstStyle/>
-          <a:p>
-            <a:r>
-              <a:rPr lang="en-US" sz="1400" dirty="0"/>
-              <a:t>(Binary)</a:t>
-            </a:r>
-          </a:p>
-        </p:txBody>
-      </p:sp>
-      <p:sp>
-        <p:nvSpPr>
-          <p:cNvPr id="2" name="Title 1">
-            <a:extLst>
-              <a:ext uri="{FF2B5EF4-FFF2-40B4-BE49-F238E27FC236}">
-                <a16:creationId xmlns:a16="http://schemas.microsoft.com/office/drawing/2014/main" id="{938327F8-CE22-DFD6-4C62-F4C385BF30D1}"/>
-              </a:ext>
-            </a:extLst>
-          </p:cNvPr>
-          <p:cNvSpPr>
-            <a:spLocks noGrp="1"/>
-          </p:cNvSpPr>
-          <p:nvPr>
-            <p:ph type="title"/>
-          </p:nvPr>
-        </p:nvSpPr>
-        <p:spPr>
-          <a:xfrm>
-            <a:off x="838200" y="365125"/>
-            <a:ext cx="10515600" cy="1325563"/>
-          </a:xfrm>
-        </p:spPr>
-        <p:txBody>
-          <a:bodyPr>
-            <a:normAutofit fontScale="90000"/>
-          </a:bodyPr>
-          <a:lstStyle/>
-          <a:p>
-            <a:r>
-              <a:rPr lang="en-US" dirty="0"/>
-              <a:t>Apply this to our questions: </a:t>
-            </a:r>
-            <a:br>
-              <a:rPr lang="en-US" dirty="0"/>
-            </a:br>
-            <a:r>
-              <a:rPr lang="en-US" sz="3100" dirty="0"/>
-              <a:t>How does the arthropod community change with grazing intensity?</a:t>
-            </a:r>
-            <a:endParaRPr lang="en-US" dirty="0"/>
-          </a:p>
-        </p:txBody>
-      </p:sp>
-      <p:sp>
-        <p:nvSpPr>
-          <p:cNvPr id="8" name="TextBox 7">
-            <a:extLst>
-              <a:ext uri="{FF2B5EF4-FFF2-40B4-BE49-F238E27FC236}">
-                <a16:creationId xmlns:a16="http://schemas.microsoft.com/office/drawing/2014/main" id="{FDF97918-CAB9-C6B1-5626-3AB18B0AE712}"/>
-              </a:ext>
-            </a:extLst>
-          </p:cNvPr>
-          <p:cNvSpPr txBox="1"/>
-          <p:nvPr/>
-        </p:nvSpPr>
-        <p:spPr>
-          <a:xfrm>
-            <a:off x="0" y="5939491"/>
-            <a:ext cx="6555658" cy="954107"/>
-          </a:xfrm>
-          <a:prstGeom prst="rect">
-            <a:avLst/>
-          </a:prstGeom>
-          <a:noFill/>
-        </p:spPr>
-        <p:txBody>
-          <a:bodyPr wrap="square" rtlCol="0">
-            <a:spAutoFit/>
-          </a:bodyPr>
-          <a:lstStyle/>
-          <a:p>
-            <a:r>
-              <a:rPr lang="en-US" sz="2800" dirty="0"/>
-              <a:t>Our groups are:</a:t>
-            </a:r>
-          </a:p>
-          <a:p>
-            <a:r>
-              <a:rPr lang="en-US" sz="2800" dirty="0"/>
-              <a:t>high grazing, low grazing, and no grazing </a:t>
-            </a:r>
-          </a:p>
-        </p:txBody>
-      </p:sp>
-      <p:sp>
-        <p:nvSpPr>
-          <p:cNvPr id="10" name="TextBox 9">
-            <a:extLst>
-              <a:ext uri="{FF2B5EF4-FFF2-40B4-BE49-F238E27FC236}">
-                <a16:creationId xmlns:a16="http://schemas.microsoft.com/office/drawing/2014/main" id="{99B29043-5FBF-8D5C-2CAF-6F90E7DF516D}"/>
-              </a:ext>
-            </a:extLst>
-          </p:cNvPr>
-          <p:cNvSpPr txBox="1"/>
-          <p:nvPr/>
-        </p:nvSpPr>
-        <p:spPr>
-          <a:xfrm>
-            <a:off x="64229" y="1595376"/>
-            <a:ext cx="5900105" cy="1200329"/>
-          </a:xfrm>
-          <a:prstGeom prst="rect">
-            <a:avLst/>
-          </a:prstGeom>
-          <a:noFill/>
-          <a:ln>
-            <a:solidFill>
-              <a:schemeClr val="tx1"/>
-            </a:solidFill>
-          </a:ln>
-        </p:spPr>
-        <p:txBody>
-          <a:bodyPr wrap="square" rtlCol="0">
-            <a:spAutoFit/>
-          </a:bodyPr>
-          <a:lstStyle/>
-          <a:p>
-            <a:r>
-              <a:rPr lang="en-US" sz="2400" dirty="0"/>
-              <a:t>BUT if we want to add any random factors into our model then we need to run a more complicated regression</a:t>
-            </a:r>
-          </a:p>
-        </p:txBody>
-      </p:sp>
-      <p:sp>
-        <p:nvSpPr>
-          <p:cNvPr id="11" name="Rectangle 10">
-            <a:extLst>
-              <a:ext uri="{FF2B5EF4-FFF2-40B4-BE49-F238E27FC236}">
-                <a16:creationId xmlns:a16="http://schemas.microsoft.com/office/drawing/2014/main" id="{945893FB-0639-065E-ED94-B16E2C56F9BE}"/>
-              </a:ext>
-            </a:extLst>
-          </p:cNvPr>
-          <p:cNvSpPr/>
-          <p:nvPr/>
-        </p:nvSpPr>
-        <p:spPr>
-          <a:xfrm>
-            <a:off x="3185652" y="3656631"/>
-            <a:ext cx="2698954" cy="1343071"/>
+            <a:off x="8358171" y="3664236"/>
+            <a:ext cx="3608438" cy="1756648"/>
           </a:xfrm>
           <a:prstGeom prst="rect">
             <a:avLst/>
@@ -11315,53 +10892,125 @@
       </p:sp>
       <p:sp>
         <p:nvSpPr>
-          <p:cNvPr id="12" name="Rectangle 11">
-            <a:extLst>
-              <a:ext uri="{FF2B5EF4-FFF2-40B4-BE49-F238E27FC236}">
-                <a16:creationId xmlns:a16="http://schemas.microsoft.com/office/drawing/2014/main" id="{F2AC6217-C587-63CF-A37E-353C4B42366B}"/>
-              </a:ext>
-            </a:extLst>
-          </p:cNvPr>
-          <p:cNvSpPr/>
-          <p:nvPr/>
+          <p:cNvPr id="2" name="Title 1">
+            <a:extLst>
+              <a:ext uri="{FF2B5EF4-FFF2-40B4-BE49-F238E27FC236}">
+                <a16:creationId xmlns:a16="http://schemas.microsoft.com/office/drawing/2014/main" id="{938327F8-CE22-DFD6-4C62-F4C385BF30D1}"/>
+              </a:ext>
+            </a:extLst>
+          </p:cNvPr>
+          <p:cNvSpPr>
+            <a:spLocks noGrp="1"/>
+          </p:cNvSpPr>
+          <p:nvPr>
+            <p:ph type="title"/>
+          </p:nvPr>
         </p:nvSpPr>
         <p:spPr>
           <a:xfrm>
-            <a:off x="6095999" y="4227325"/>
-            <a:ext cx="5765229" cy="772378"/>
+            <a:off x="838200" y="365125"/>
+            <a:ext cx="10515600" cy="1325563"/>
+          </a:xfrm>
+        </p:spPr>
+        <p:txBody>
+          <a:bodyPr>
+            <a:normAutofit/>
+          </a:bodyPr>
+          <a:lstStyle/>
+          <a:p>
+            <a:r>
+              <a:rPr lang="en-US" dirty="0"/>
+              <a:t>Apply this to our questions: </a:t>
+            </a:r>
+            <a:br>
+              <a:rPr lang="en-US" dirty="0"/>
+            </a:br>
+            <a:r>
+              <a:rPr lang="en-US" sz="3100" dirty="0"/>
+              <a:t>Does the arthropod community change with grazing intensity?</a:t>
+            </a:r>
+            <a:endParaRPr lang="en-US" dirty="0"/>
+          </a:p>
+        </p:txBody>
+      </p:sp>
+      <p:sp>
+        <p:nvSpPr>
+          <p:cNvPr id="8" name="TextBox 7">
+            <a:extLst>
+              <a:ext uri="{FF2B5EF4-FFF2-40B4-BE49-F238E27FC236}">
+                <a16:creationId xmlns:a16="http://schemas.microsoft.com/office/drawing/2014/main" id="{FDF97918-CAB9-C6B1-5626-3AB18B0AE712}"/>
+              </a:ext>
+            </a:extLst>
+          </p:cNvPr>
+          <p:cNvSpPr txBox="1"/>
+          <p:nvPr/>
+        </p:nvSpPr>
+        <p:spPr>
+          <a:xfrm>
+            <a:off x="0" y="5939491"/>
+            <a:ext cx="6555658" cy="954107"/>
           </a:xfrm>
           <a:prstGeom prst="rect">
             <a:avLst/>
           </a:prstGeom>
           <a:noFill/>
-          <a:ln w="28575">
+        </p:spPr>
+        <p:txBody>
+          <a:bodyPr wrap="square" rtlCol="0">
+            <a:spAutoFit/>
+          </a:bodyPr>
+          <a:lstStyle/>
+          <a:p>
+            <a:r>
+              <a:rPr lang="en-US" sz="2800" dirty="0"/>
+              <a:t>Our groups are:</a:t>
+            </a:r>
+          </a:p>
+          <a:p>
+            <a:r>
+              <a:rPr lang="en-US" sz="2800" dirty="0"/>
+              <a:t>high grazing, low grazing, and no grazing </a:t>
+            </a:r>
+          </a:p>
+        </p:txBody>
+      </p:sp>
+      <p:sp>
+        <p:nvSpPr>
+          <p:cNvPr id="10" name="TextBox 9">
+            <a:extLst>
+              <a:ext uri="{FF2B5EF4-FFF2-40B4-BE49-F238E27FC236}">
+                <a16:creationId xmlns:a16="http://schemas.microsoft.com/office/drawing/2014/main" id="{99B29043-5FBF-8D5C-2CAF-6F90E7DF516D}"/>
+              </a:ext>
+            </a:extLst>
+          </p:cNvPr>
+          <p:cNvSpPr txBox="1"/>
+          <p:nvPr/>
+        </p:nvSpPr>
+        <p:spPr>
+          <a:xfrm>
+            <a:off x="64229" y="1595376"/>
+            <a:ext cx="5900105" cy="1200329"/>
+          </a:xfrm>
+          <a:prstGeom prst="rect">
+            <a:avLst/>
+          </a:prstGeom>
+          <a:noFill/>
+          <a:ln>
             <a:solidFill>
-              <a:srgbClr val="FF0000"/>
+              <a:schemeClr val="tx1"/>
             </a:solidFill>
           </a:ln>
         </p:spPr>
-        <p:style>
-          <a:lnRef idx="2">
-            <a:schemeClr val="accent1">
-              <a:shade val="15000"/>
-            </a:schemeClr>
-          </a:lnRef>
-          <a:fillRef idx="1">
-            <a:schemeClr val="accent1"/>
-          </a:fillRef>
-          <a:effectRef idx="0">
-            <a:schemeClr val="accent1"/>
-          </a:effectRef>
-          <a:fontRef idx="minor">
-            <a:schemeClr val="lt1"/>
-          </a:fontRef>
-        </p:style>
-        <p:txBody>
-          <a:bodyPr rtlCol="0" anchor="ctr"/>
-          <a:lstStyle/>
-          <a:p>
-            <a:pPr algn="ctr"/>
-            <a:endParaRPr lang="en-US"/>
+        <p:txBody>
+          <a:bodyPr wrap="square" rtlCol="0">
+            <a:spAutoFit/>
+          </a:bodyPr>
+          <a:lstStyle/>
+          <a:p>
+            <a:r>
+              <a:rPr lang="en-US" sz="2400" dirty="0"/>
+              <a:t>BUT if we want to add any random factors into our model then we need to run a more complicated regression</a:t>
+            </a:r>
           </a:p>
         </p:txBody>
       </p:sp>
@@ -11378,7 +11027,7 @@
 </p:sld>
 </file>
 
-<file path=ppt/slides/slide33.xml><?xml version="1.0" encoding="utf-8"?>
+<file path=ppt/slides/slide32.xml><?xml version="1.0" encoding="utf-8"?>
 <p:sld xmlns:a="http://schemas.openxmlformats.org/drawingml/2006/main" xmlns:r="http://schemas.openxmlformats.org/officeDocument/2006/relationships" xmlns:p="http://schemas.openxmlformats.org/presentationml/2006/main">
   <p:cSld>
     <p:spTree>
@@ -11477,7 +11126,7 @@
 </p:sld>
 </file>
 
-<file path=ppt/slides/slide34.xml><?xml version="1.0" encoding="utf-8"?>
+<file path=ppt/slides/slide33.xml><?xml version="1.0" encoding="utf-8"?>
 <p:sld xmlns:a="http://schemas.openxmlformats.org/drawingml/2006/main" xmlns:r="http://schemas.openxmlformats.org/officeDocument/2006/relationships" xmlns:p="http://schemas.openxmlformats.org/presentationml/2006/main">
   <p:cSld>
     <p:spTree>
@@ -11500,99 +11149,6 @@
           <a:chExt cx="0" cy="0"/>
         </a:xfrm>
       </p:grpSpPr>
-      <p:pic>
-        <p:nvPicPr>
-          <p:cNvPr id="5" name="Content Placeholder 4" descr="A table with text on it&#10;&#10;Description automatically generated">
-            <a:extLst>
-              <a:ext uri="{FF2B5EF4-FFF2-40B4-BE49-F238E27FC236}">
-                <a16:creationId xmlns:a16="http://schemas.microsoft.com/office/drawing/2014/main" id="{B2DC0FA9-1EB0-6E37-4776-0BA40F8C5129}"/>
-              </a:ext>
-            </a:extLst>
-          </p:cNvPr>
-          <p:cNvPicPr>
-            <a:picLocks noGrp="1" noChangeAspect="1"/>
-          </p:cNvPicPr>
-          <p:nvPr>
-            <p:ph idx="1"/>
-          </p:nvPr>
-        </p:nvPicPr>
-        <p:blipFill>
-          <a:blip r:embed="rId2"/>
-          <a:srcRect l="18438" t="5776" r="14895"/>
-          <a:stretch/>
-        </p:blipFill>
-        <p:spPr>
-          <a:xfrm>
-            <a:off x="6028562" y="1828755"/>
-            <a:ext cx="5832667" cy="4926776"/>
-          </a:xfrm>
-        </p:spPr>
-      </p:pic>
-      <p:pic>
-        <p:nvPicPr>
-          <p:cNvPr id="6" name="Picture 5" descr="A diagram of a question&#10;&#10;Description automatically generated">
-            <a:extLst>
-              <a:ext uri="{FF2B5EF4-FFF2-40B4-BE49-F238E27FC236}">
-                <a16:creationId xmlns:a16="http://schemas.microsoft.com/office/drawing/2014/main" id="{73F54026-C234-5E9E-D4E9-3F87DB4D4454}"/>
-              </a:ext>
-            </a:extLst>
-          </p:cNvPr>
-          <p:cNvPicPr>
-            <a:picLocks noChangeAspect="1"/>
-          </p:cNvPicPr>
-          <p:nvPr/>
-        </p:nvPicPr>
-        <p:blipFill>
-          <a:blip r:embed="rId3"/>
-          <a:stretch>
-            <a:fillRect/>
-          </a:stretch>
-        </p:blipFill>
-        <p:spPr>
-          <a:xfrm>
-            <a:off x="0" y="2700392"/>
-            <a:ext cx="6028562" cy="2990546"/>
-          </a:xfrm>
-          <a:prstGeom prst="rect">
-            <a:avLst/>
-          </a:prstGeom>
-        </p:spPr>
-      </p:pic>
-      <p:sp>
-        <p:nvSpPr>
-          <p:cNvPr id="7" name="TextBox 6">
-            <a:extLst>
-              <a:ext uri="{FF2B5EF4-FFF2-40B4-BE49-F238E27FC236}">
-                <a16:creationId xmlns:a16="http://schemas.microsoft.com/office/drawing/2014/main" id="{BC301A01-FA2E-0230-D431-0D33AB9B3C2F}"/>
-              </a:ext>
-            </a:extLst>
-          </p:cNvPr>
-          <p:cNvSpPr txBox="1"/>
-          <p:nvPr/>
-        </p:nvSpPr>
-        <p:spPr>
-          <a:xfrm>
-            <a:off x="8377083" y="5383161"/>
-            <a:ext cx="1135626" cy="307777"/>
-          </a:xfrm>
-          <a:prstGeom prst="rect">
-            <a:avLst/>
-          </a:prstGeom>
-          <a:noFill/>
-        </p:spPr>
-        <p:txBody>
-          <a:bodyPr wrap="square" rtlCol="0">
-            <a:spAutoFit/>
-          </a:bodyPr>
-          <a:lstStyle/>
-          <a:p>
-            <a:r>
-              <a:rPr lang="en-US" sz="1400" dirty="0"/>
-              <a:t>(Binary)</a:t>
-            </a:r>
-          </a:p>
-        </p:txBody>
-      </p:sp>
       <p:sp>
         <p:nvSpPr>
           <p:cNvPr id="2" name="Title 1">
@@ -11630,7 +11186,7 @@
             </a:br>
             <a:r>
               <a:rPr lang="en-US" sz="2800" dirty="0"/>
-              <a:t>How does the arthropod community change with grazing intensity?</a:t>
+              <a:t>Does the arthropod community change with grazing intensity?</a:t>
             </a:r>
           </a:p>
         </p:txBody>
@@ -11676,12 +11232,42 @@
           </a:p>
         </p:txBody>
       </p:sp>
-      <p:sp>
-        <p:nvSpPr>
-          <p:cNvPr id="3" name="Rectangle 2">
-            <a:extLst>
-              <a:ext uri="{FF2B5EF4-FFF2-40B4-BE49-F238E27FC236}">
-                <a16:creationId xmlns:a16="http://schemas.microsoft.com/office/drawing/2014/main" id="{46B3F7CC-3FFE-84C1-7D9D-0A22ABFE6A21}"/>
+      <p:pic>
+        <p:nvPicPr>
+          <p:cNvPr id="14" name="Picture 13" descr="A diagram of a question&#10;&#10;Description automatically generated">
+            <a:extLst>
+              <a:ext uri="{FF2B5EF4-FFF2-40B4-BE49-F238E27FC236}">
+                <a16:creationId xmlns:a16="http://schemas.microsoft.com/office/drawing/2014/main" id="{25ECCC1A-C7E2-9F05-3E6E-6AB52BC07D9D}"/>
+              </a:ext>
+            </a:extLst>
+          </p:cNvPr>
+          <p:cNvPicPr>
+            <a:picLocks noChangeAspect="1"/>
+          </p:cNvPicPr>
+          <p:nvPr/>
+        </p:nvPicPr>
+        <p:blipFill>
+          <a:blip r:embed="rId2"/>
+          <a:stretch>
+            <a:fillRect/>
+          </a:stretch>
+        </p:blipFill>
+        <p:spPr>
+          <a:xfrm>
+            <a:off x="4060721" y="2457920"/>
+            <a:ext cx="7885471" cy="3911690"/>
+          </a:xfrm>
+          <a:prstGeom prst="rect">
+            <a:avLst/>
+          </a:prstGeom>
+        </p:spPr>
+      </p:pic>
+      <p:sp>
+        <p:nvSpPr>
+          <p:cNvPr id="15" name="Rectangle 14">
+            <a:extLst>
+              <a:ext uri="{FF2B5EF4-FFF2-40B4-BE49-F238E27FC236}">
+                <a16:creationId xmlns:a16="http://schemas.microsoft.com/office/drawing/2014/main" id="{43C9F8DE-82DE-0E97-FD7B-613141E1889A}"/>
               </a:ext>
             </a:extLst>
           </p:cNvPr>
@@ -11690,8 +11276,8 @@
         </p:nvSpPr>
         <p:spPr>
           <a:xfrm>
-            <a:off x="3185652" y="3656631"/>
-            <a:ext cx="2698954" cy="1343071"/>
+            <a:off x="8219768" y="3710403"/>
+            <a:ext cx="3608438" cy="1756648"/>
           </a:xfrm>
           <a:prstGeom prst="rect">
             <a:avLst/>
@@ -11730,58 +11316,6 @@
       </p:sp>
       <p:sp>
         <p:nvSpPr>
-          <p:cNvPr id="4" name="Rectangle 3">
-            <a:extLst>
-              <a:ext uri="{FF2B5EF4-FFF2-40B4-BE49-F238E27FC236}">
-                <a16:creationId xmlns:a16="http://schemas.microsoft.com/office/drawing/2014/main" id="{C6975ED6-09A3-93E2-D7B0-BC16B92F2A87}"/>
-              </a:ext>
-            </a:extLst>
-          </p:cNvPr>
-          <p:cNvSpPr/>
-          <p:nvPr/>
-        </p:nvSpPr>
-        <p:spPr>
-          <a:xfrm>
-            <a:off x="6095999" y="4227325"/>
-            <a:ext cx="5765229" cy="772378"/>
-          </a:xfrm>
-          <a:prstGeom prst="rect">
-            <a:avLst/>
-          </a:prstGeom>
-          <a:noFill/>
-          <a:ln w="28575">
-            <a:solidFill>
-              <a:srgbClr val="FF0000"/>
-            </a:solidFill>
-          </a:ln>
-        </p:spPr>
-        <p:style>
-          <a:lnRef idx="2">
-            <a:schemeClr val="accent1">
-              <a:shade val="15000"/>
-            </a:schemeClr>
-          </a:lnRef>
-          <a:fillRef idx="1">
-            <a:schemeClr val="accent1"/>
-          </a:fillRef>
-          <a:effectRef idx="0">
-            <a:schemeClr val="accent1"/>
-          </a:effectRef>
-          <a:fontRef idx="minor">
-            <a:schemeClr val="lt1"/>
-          </a:fontRef>
-        </p:style>
-        <p:txBody>
-          <a:bodyPr rtlCol="0" anchor="ctr"/>
-          <a:lstStyle/>
-          <a:p>
-            <a:pPr algn="ctr"/>
-            <a:endParaRPr lang="en-US"/>
-          </a:p>
-        </p:txBody>
-      </p:sp>
-      <p:sp>
-        <p:nvSpPr>
           <p:cNvPr id="9" name="TextBox 8">
             <a:extLst>
               <a:ext uri="{FF2B5EF4-FFF2-40B4-BE49-F238E27FC236}">
@@ -11833,7 +11367,7 @@
 </p:sld>
 </file>
 
-<file path=ppt/slides/slide35.xml><?xml version="1.0" encoding="utf-8"?>
+<file path=ppt/slides/slide34.xml><?xml version="1.0" encoding="utf-8"?>
 <p:sld xmlns:a="http://schemas.openxmlformats.org/drawingml/2006/main" xmlns:r="http://schemas.openxmlformats.org/officeDocument/2006/relationships" xmlns:p="http://schemas.openxmlformats.org/presentationml/2006/main">
   <p:cSld>
     <p:spTree>
@@ -12014,7 +11548,7 @@
 </p:sld>
 </file>
 
-<file path=ppt/slides/slide36.xml><?xml version="1.0" encoding="utf-8"?>
+<file path=ppt/slides/slide35.xml><?xml version="1.0" encoding="utf-8"?>
 <p:sld xmlns:a="http://schemas.openxmlformats.org/drawingml/2006/main" xmlns:r="http://schemas.openxmlformats.org/officeDocument/2006/relationships" xmlns:p="http://schemas.openxmlformats.org/presentationml/2006/main">
   <p:cSld>
     <p:spTree>
@@ -12230,7 +11764,7 @@
 </p:sld>
 </file>
 
-<file path=ppt/slides/slide37.xml><?xml version="1.0" encoding="utf-8"?>
+<file path=ppt/slides/slide36.xml><?xml version="1.0" encoding="utf-8"?>
 <p:sld xmlns:a="http://schemas.openxmlformats.org/drawingml/2006/main" xmlns:r="http://schemas.openxmlformats.org/officeDocument/2006/relationships" xmlns:p="http://schemas.openxmlformats.org/presentationml/2006/main">
   <p:cSld>
     <p:spTree>
@@ -12255,34 +11789,6 @@
       </p:grpSpPr>
       <p:pic>
         <p:nvPicPr>
-          <p:cNvPr id="5" name="Content Placeholder 4" descr="A table with text on it&#10;&#10;Description automatically generated">
-            <a:extLst>
-              <a:ext uri="{FF2B5EF4-FFF2-40B4-BE49-F238E27FC236}">
-                <a16:creationId xmlns:a16="http://schemas.microsoft.com/office/drawing/2014/main" id="{0572042B-4A9C-88A2-1A6F-BFEB403CCABF}"/>
-              </a:ext>
-            </a:extLst>
-          </p:cNvPr>
-          <p:cNvPicPr>
-            <a:picLocks noGrp="1" noChangeAspect="1"/>
-          </p:cNvPicPr>
-          <p:nvPr>
-            <p:ph idx="1"/>
-          </p:nvPr>
-        </p:nvPicPr>
-        <p:blipFill>
-          <a:blip r:embed="rId2"/>
-          <a:srcRect l="18438" t="5776" r="14895"/>
-          <a:stretch/>
-        </p:blipFill>
-        <p:spPr>
-          <a:xfrm>
-            <a:off x="6028562" y="1828755"/>
-            <a:ext cx="5832667" cy="4926776"/>
-          </a:xfrm>
-        </p:spPr>
-      </p:pic>
-      <p:pic>
-        <p:nvPicPr>
           <p:cNvPr id="6" name="Picture 5" descr="A diagram of a question&#10;&#10;Description automatically generated">
             <a:extLst>
               <a:ext uri="{FF2B5EF4-FFF2-40B4-BE49-F238E27FC236}">
@@ -12296,56 +11802,21 @@
           <p:nvPr/>
         </p:nvPicPr>
         <p:blipFill>
-          <a:blip r:embed="rId3"/>
+          <a:blip r:embed="rId2"/>
           <a:stretch>
             <a:fillRect/>
           </a:stretch>
         </p:blipFill>
         <p:spPr>
           <a:xfrm>
-            <a:off x="0" y="2700392"/>
-            <a:ext cx="6028562" cy="2990546"/>
+            <a:off x="2163096" y="1690688"/>
+            <a:ext cx="7885471" cy="3911690"/>
           </a:xfrm>
           <a:prstGeom prst="rect">
             <a:avLst/>
           </a:prstGeom>
         </p:spPr>
       </p:pic>
-      <p:sp>
-        <p:nvSpPr>
-          <p:cNvPr id="7" name="TextBox 6">
-            <a:extLst>
-              <a:ext uri="{FF2B5EF4-FFF2-40B4-BE49-F238E27FC236}">
-                <a16:creationId xmlns:a16="http://schemas.microsoft.com/office/drawing/2014/main" id="{C6BA56A7-173B-DD08-8AAC-4AA8D43E74C8}"/>
-              </a:ext>
-            </a:extLst>
-          </p:cNvPr>
-          <p:cNvSpPr txBox="1"/>
-          <p:nvPr/>
-        </p:nvSpPr>
-        <p:spPr>
-          <a:xfrm>
-            <a:off x="8377083" y="5383161"/>
-            <a:ext cx="1135626" cy="307777"/>
-          </a:xfrm>
-          <a:prstGeom prst="rect">
-            <a:avLst/>
-          </a:prstGeom>
-          <a:noFill/>
-        </p:spPr>
-        <p:txBody>
-          <a:bodyPr wrap="square" rtlCol="0">
-            <a:spAutoFit/>
-          </a:bodyPr>
-          <a:lstStyle/>
-          <a:p>
-            <a:r>
-              <a:rPr lang="en-US" sz="1400" dirty="0"/>
-              <a:t>(Binary)</a:t>
-            </a:r>
-          </a:p>
-        </p:txBody>
-      </p:sp>
       <p:sp>
         <p:nvSpPr>
           <p:cNvPr id="2" name="Title 1">
@@ -12449,8 +11920,8 @@
         </p:nvSpPr>
         <p:spPr>
           <a:xfrm>
-            <a:off x="3185652" y="3656631"/>
-            <a:ext cx="2698954" cy="1343071"/>
+            <a:off x="6322143" y="2943171"/>
+            <a:ext cx="3608438" cy="1756648"/>
           </a:xfrm>
           <a:prstGeom prst="rect">
             <a:avLst/>
@@ -12487,28 +11958,338 @@
           </a:p>
         </p:txBody>
       </p:sp>
-      <p:sp>
-        <p:nvSpPr>
-          <p:cNvPr id="4" name="Rectangle 3">
-            <a:extLst>
-              <a:ext uri="{FF2B5EF4-FFF2-40B4-BE49-F238E27FC236}">
-                <a16:creationId xmlns:a16="http://schemas.microsoft.com/office/drawing/2014/main" id="{0EB91B50-C6C3-883A-3FC2-4356867A3338}"/>
-              </a:ext>
-            </a:extLst>
-          </p:cNvPr>
-          <p:cNvSpPr/>
+    </p:spTree>
+    <p:extLst>
+      <p:ext uri="{BB962C8B-B14F-4D97-AF65-F5344CB8AC3E}">
+        <p14:creationId xmlns:p14="http://schemas.microsoft.com/office/powerpoint/2010/main" val="3297949655"/>
+      </p:ext>
+    </p:extLst>
+  </p:cSld>
+  <p:clrMapOvr>
+    <a:masterClrMapping/>
+  </p:clrMapOvr>
+</p:sld>
+</file>
+
+<file path=ppt/slides/slide37.xml><?xml version="1.0" encoding="utf-8"?>
+<p:sld xmlns:a="http://schemas.openxmlformats.org/drawingml/2006/main" xmlns:r="http://schemas.openxmlformats.org/officeDocument/2006/relationships" xmlns:p="http://schemas.openxmlformats.org/presentationml/2006/main">
+  <p:cSld>
+    <p:spTree>
+      <p:nvGrpSpPr>
+        <p:cNvPr id="1" name=""/>
+        <p:cNvGrpSpPr/>
+        <p:nvPr/>
+      </p:nvGrpSpPr>
+      <p:grpSpPr>
+        <a:xfrm>
+          <a:off x="0" y="0"/>
+          <a:ext cx="0" cy="0"/>
+          <a:chOff x="0" y="0"/>
+          <a:chExt cx="0" cy="0"/>
+        </a:xfrm>
+      </p:grpSpPr>
+      <p:sp>
+        <p:nvSpPr>
+          <p:cNvPr id="8" name="TextBox 7">
+            <a:extLst>
+              <a:ext uri="{FF2B5EF4-FFF2-40B4-BE49-F238E27FC236}">
+                <a16:creationId xmlns:a16="http://schemas.microsoft.com/office/drawing/2014/main" id="{419D3EE4-E12C-4BCE-BA83-04A8BD38A291}"/>
+              </a:ext>
+            </a:extLst>
+          </p:cNvPr>
+          <p:cNvSpPr txBox="1"/>
           <p:nvPr/>
         </p:nvSpPr>
         <p:spPr>
           <a:xfrm>
-            <a:off x="6095999" y="4227325"/>
-            <a:ext cx="5765229" cy="772378"/>
+            <a:off x="0" y="6200487"/>
+            <a:ext cx="11572569" cy="584775"/>
           </a:xfrm>
           <a:prstGeom prst="rect">
             <a:avLst/>
           </a:prstGeom>
           <a:noFill/>
-          <a:ln w="28575">
+        </p:spPr>
+        <p:txBody>
+          <a:bodyPr wrap="square" rtlCol="0">
+            <a:spAutoFit/>
+          </a:bodyPr>
+          <a:lstStyle/>
+          <a:p>
+            <a:r>
+              <a:rPr lang="en-US" sz="3200" dirty="0"/>
+              <a:t>Do the same thing for Richness and evenness (Lines 197*227)</a:t>
+            </a:r>
+          </a:p>
+        </p:txBody>
+      </p:sp>
+      <p:pic>
+        <p:nvPicPr>
+          <p:cNvPr id="14" name="Picture 13" descr="A screenshot of a computer program&#10;&#10;Description automatically generated">
+            <a:extLst>
+              <a:ext uri="{FF2B5EF4-FFF2-40B4-BE49-F238E27FC236}">
+                <a16:creationId xmlns:a16="http://schemas.microsoft.com/office/drawing/2014/main" id="{D9DBE482-E5B1-93A1-4EA3-BC66BCB123AB}"/>
+              </a:ext>
+            </a:extLst>
+          </p:cNvPr>
+          <p:cNvPicPr>
+            <a:picLocks noChangeAspect="1"/>
+          </p:cNvPicPr>
+          <p:nvPr/>
+        </p:nvPicPr>
+        <p:blipFill>
+          <a:blip r:embed="rId2"/>
+          <a:stretch>
+            <a:fillRect/>
+          </a:stretch>
+        </p:blipFill>
+        <p:spPr>
+          <a:xfrm>
+            <a:off x="0" y="1503875"/>
+            <a:ext cx="7847421" cy="2822318"/>
+          </a:xfrm>
+          <a:prstGeom prst="rect">
+            <a:avLst/>
+          </a:prstGeom>
+        </p:spPr>
+      </p:pic>
+      <p:sp>
+        <p:nvSpPr>
+          <p:cNvPr id="15" name="Title 1">
+            <a:extLst>
+              <a:ext uri="{FF2B5EF4-FFF2-40B4-BE49-F238E27FC236}">
+                <a16:creationId xmlns:a16="http://schemas.microsoft.com/office/drawing/2014/main" id="{318B16C0-4F6A-633A-4F57-4742525CA8B8}"/>
+              </a:ext>
+            </a:extLst>
+          </p:cNvPr>
+          <p:cNvSpPr>
+            <a:spLocks noGrp="1"/>
+          </p:cNvSpPr>
+          <p:nvPr>
+            <p:ph type="title"/>
+          </p:nvPr>
+        </p:nvSpPr>
+        <p:spPr>
+          <a:xfrm>
+            <a:off x="838200" y="365125"/>
+            <a:ext cx="10515600" cy="1325563"/>
+          </a:xfrm>
+        </p:spPr>
+        <p:txBody>
+          <a:bodyPr>
+            <a:normAutofit fontScale="90000"/>
+          </a:bodyPr>
+          <a:lstStyle/>
+          <a:p>
+            <a:r>
+              <a:rPr lang="en-US" dirty="0"/>
+              <a:t>Apply this to our questions: </a:t>
+            </a:r>
+            <a:br>
+              <a:rPr lang="en-US" dirty="0"/>
+            </a:br>
+            <a:r>
+              <a:rPr lang="en-US" sz="2800" dirty="0"/>
+              <a:t>Does the arthropod community change from year to year with grazing intensity?</a:t>
+            </a:r>
+          </a:p>
+        </p:txBody>
+      </p:sp>
+      <p:pic>
+        <p:nvPicPr>
+          <p:cNvPr id="17" name="Picture 16" descr="A computer screen with numbers and text&#10;&#10;Description automatically generated">
+            <a:extLst>
+              <a:ext uri="{FF2B5EF4-FFF2-40B4-BE49-F238E27FC236}">
+                <a16:creationId xmlns:a16="http://schemas.microsoft.com/office/drawing/2014/main" id="{BD10BF38-66F4-2499-4DC0-8B63240CD042}"/>
+              </a:ext>
+            </a:extLst>
+          </p:cNvPr>
+          <p:cNvPicPr>
+            <a:picLocks noChangeAspect="1"/>
+          </p:cNvPicPr>
+          <p:nvPr/>
+        </p:nvPicPr>
+        <p:blipFill>
+          <a:blip r:embed="rId3"/>
+          <a:stretch>
+            <a:fillRect/>
+          </a:stretch>
+        </p:blipFill>
+        <p:spPr>
+          <a:xfrm>
+            <a:off x="6246919" y="2900516"/>
+            <a:ext cx="5945081" cy="3287681"/>
+          </a:xfrm>
+          <a:prstGeom prst="rect">
+            <a:avLst/>
+          </a:prstGeom>
+        </p:spPr>
+      </p:pic>
+    </p:spTree>
+    <p:extLst>
+      <p:ext uri="{BB962C8B-B14F-4D97-AF65-F5344CB8AC3E}">
+        <p14:creationId xmlns:p14="http://schemas.microsoft.com/office/powerpoint/2010/main" val="210658953"/>
+      </p:ext>
+    </p:extLst>
+  </p:cSld>
+  <p:clrMapOvr>
+    <a:masterClrMapping/>
+  </p:clrMapOvr>
+</p:sld>
+</file>
+
+<file path=ppt/slides/slide38.xml><?xml version="1.0" encoding="utf-8"?>
+<p:sld xmlns:a="http://schemas.openxmlformats.org/drawingml/2006/main" xmlns:r="http://schemas.openxmlformats.org/officeDocument/2006/relationships" xmlns:p="http://schemas.openxmlformats.org/presentationml/2006/main">
+  <p:cSld>
+    <p:spTree>
+      <p:nvGrpSpPr>
+        <p:cNvPr id="1" name="">
+          <a:extLst>
+            <a:ext uri="{FF2B5EF4-FFF2-40B4-BE49-F238E27FC236}">
+              <a16:creationId xmlns:a16="http://schemas.microsoft.com/office/drawing/2014/main" id="{45AFF74B-A106-D54B-4A91-17F3B5B58D93}"/>
+            </a:ext>
+          </a:extLst>
+        </p:cNvPr>
+        <p:cNvGrpSpPr/>
+        <p:nvPr/>
+      </p:nvGrpSpPr>
+      <p:grpSpPr>
+        <a:xfrm>
+          <a:off x="0" y="0"/>
+          <a:ext cx="0" cy="0"/>
+          <a:chOff x="0" y="0"/>
+          <a:chExt cx="0" cy="0"/>
+        </a:xfrm>
+      </p:grpSpPr>
+      <p:sp>
+        <p:nvSpPr>
+          <p:cNvPr id="15" name="Title 1">
+            <a:extLst>
+              <a:ext uri="{FF2B5EF4-FFF2-40B4-BE49-F238E27FC236}">
+                <a16:creationId xmlns:a16="http://schemas.microsoft.com/office/drawing/2014/main" id="{D83CF52A-C239-23A6-13EE-6C8CA54CA128}"/>
+              </a:ext>
+            </a:extLst>
+          </p:cNvPr>
+          <p:cNvSpPr>
+            <a:spLocks noGrp="1"/>
+          </p:cNvSpPr>
+          <p:nvPr>
+            <p:ph type="title"/>
+          </p:nvPr>
+        </p:nvSpPr>
+        <p:spPr>
+          <a:xfrm>
+            <a:off x="838200" y="365125"/>
+            <a:ext cx="10515600" cy="1325563"/>
+          </a:xfrm>
+        </p:spPr>
+        <p:txBody>
+          <a:bodyPr>
+            <a:normAutofit fontScale="90000"/>
+          </a:bodyPr>
+          <a:lstStyle/>
+          <a:p>
+            <a:r>
+              <a:rPr lang="en-US" dirty="0"/>
+              <a:t>Apply this to our questions: </a:t>
+            </a:r>
+            <a:br>
+              <a:rPr lang="en-US" dirty="0"/>
+            </a:br>
+            <a:r>
+              <a:rPr lang="en-US" sz="2800" dirty="0"/>
+              <a:t>Does the arthropod community change from year to year with grazing intensity?</a:t>
+            </a:r>
+          </a:p>
+        </p:txBody>
+      </p:sp>
+      <p:sp>
+        <p:nvSpPr>
+          <p:cNvPr id="2" name="TextBox 1">
+            <a:extLst>
+              <a:ext uri="{FF2B5EF4-FFF2-40B4-BE49-F238E27FC236}">
+                <a16:creationId xmlns:a16="http://schemas.microsoft.com/office/drawing/2014/main" id="{DBA2B3A3-44B6-6A28-4F39-7843D524DC1C}"/>
+              </a:ext>
+            </a:extLst>
+          </p:cNvPr>
+          <p:cNvSpPr txBox="1"/>
+          <p:nvPr/>
+        </p:nvSpPr>
+        <p:spPr>
+          <a:xfrm>
+            <a:off x="0" y="6488668"/>
+            <a:ext cx="6434454" cy="369332"/>
+          </a:xfrm>
+          <a:prstGeom prst="rect">
+            <a:avLst/>
+          </a:prstGeom>
+          <a:noFill/>
+        </p:spPr>
+        <p:txBody>
+          <a:bodyPr wrap="none" rtlCol="0">
+            <a:spAutoFit/>
+          </a:bodyPr>
+          <a:lstStyle/>
+          <a:p>
+            <a:r>
+              <a:rPr lang="en-US" dirty="0"/>
+              <a:t>Run a post-hoc test to see which years are different for diversity</a:t>
+            </a:r>
+          </a:p>
+        </p:txBody>
+      </p:sp>
+      <p:pic>
+        <p:nvPicPr>
+          <p:cNvPr id="4" name="Picture 3" descr="A screenshot of a computer program&#10;&#10;Description automatically generated">
+            <a:extLst>
+              <a:ext uri="{FF2B5EF4-FFF2-40B4-BE49-F238E27FC236}">
+                <a16:creationId xmlns:a16="http://schemas.microsoft.com/office/drawing/2014/main" id="{70A7150B-CF29-97F7-E020-B5510991ABF8}"/>
+              </a:ext>
+            </a:extLst>
+          </p:cNvPr>
+          <p:cNvPicPr>
+            <a:picLocks noChangeAspect="1"/>
+          </p:cNvPicPr>
+          <p:nvPr/>
+        </p:nvPicPr>
+        <p:blipFill>
+          <a:blip r:embed="rId2"/>
+          <a:stretch>
+            <a:fillRect/>
+          </a:stretch>
+        </p:blipFill>
+        <p:spPr>
+          <a:xfrm>
+            <a:off x="985684" y="1690688"/>
+            <a:ext cx="7594600" cy="3797300"/>
+          </a:xfrm>
+          <a:prstGeom prst="rect">
+            <a:avLst/>
+          </a:prstGeom>
+        </p:spPr>
+      </p:pic>
+      <p:sp>
+        <p:nvSpPr>
+          <p:cNvPr id="5" name="Rectangle 4">
+            <a:extLst>
+              <a:ext uri="{FF2B5EF4-FFF2-40B4-BE49-F238E27FC236}">
+                <a16:creationId xmlns:a16="http://schemas.microsoft.com/office/drawing/2014/main" id="{792F3E10-9D35-E32F-A21A-4C3E2ACE48EF}"/>
+              </a:ext>
+            </a:extLst>
+          </p:cNvPr>
+          <p:cNvSpPr/>
+          <p:nvPr/>
+        </p:nvSpPr>
+        <p:spPr>
+          <a:xfrm>
+            <a:off x="1002890" y="4011561"/>
+            <a:ext cx="4572000" cy="1150374"/>
+          </a:xfrm>
+          <a:prstGeom prst="rect">
+            <a:avLst/>
+          </a:prstGeom>
+          <a:noFill/>
+          <a:ln>
             <a:solidFill>
               <a:srgbClr val="FF0000"/>
             </a:solidFill>
@@ -12542,7 +12323,7 @@
     </p:spTree>
     <p:extLst>
       <p:ext uri="{BB962C8B-B14F-4D97-AF65-F5344CB8AC3E}">
-        <p14:creationId xmlns:p14="http://schemas.microsoft.com/office/powerpoint/2010/main" val="3297949655"/>
+        <p14:creationId xmlns:p14="http://schemas.microsoft.com/office/powerpoint/2010/main" val="649242528"/>
       </p:ext>
     </p:extLst>
   </p:cSld>
@@ -12552,7 +12333,7 @@
 </p:sld>
 </file>
 
-<file path=ppt/slides/slide38.xml><?xml version="1.0" encoding="utf-8"?>
+<file path=ppt/slides/slide39.xml><?xml version="1.0" encoding="utf-8"?>
 <p:sld xmlns:a="http://schemas.openxmlformats.org/drawingml/2006/main" xmlns:r="http://schemas.openxmlformats.org/officeDocument/2006/relationships" xmlns:p="http://schemas.openxmlformats.org/presentationml/2006/main">
   <p:cSld>
     <p:spTree>
@@ -12574,7 +12355,7 @@
           <p:cNvPr id="2" name="Title 1">
             <a:extLst>
               <a:ext uri="{FF2B5EF4-FFF2-40B4-BE49-F238E27FC236}">
-                <a16:creationId xmlns:a16="http://schemas.microsoft.com/office/drawing/2014/main" id="{583E543B-A326-AF55-DE67-306417768716}"/>
+                <a16:creationId xmlns:a16="http://schemas.microsoft.com/office/drawing/2014/main" id="{B27D21C9-CF1D-E786-9F07-DFE51514E207}"/>
               </a:ext>
             </a:extLst>
           </p:cNvPr>
@@ -12587,46 +12368,24 @@
         </p:nvSpPr>
         <p:spPr/>
         <p:txBody>
-          <a:bodyPr/>
-          <a:lstStyle/>
-          <a:p>
-            <a:endParaRPr lang="en-US"/>
-          </a:p>
-        </p:txBody>
-      </p:sp>
-      <p:pic>
-        <p:nvPicPr>
-          <p:cNvPr id="5" name="Content Placeholder 4" descr="A screenshot of a computer program&#10;&#10;Description automatically generated">
-            <a:extLst>
-              <a:ext uri="{FF2B5EF4-FFF2-40B4-BE49-F238E27FC236}">
-                <a16:creationId xmlns:a16="http://schemas.microsoft.com/office/drawing/2014/main" id="{C1488085-D6E4-082B-7E60-D4BBFD680BEE}"/>
-              </a:ext>
-            </a:extLst>
-          </p:cNvPr>
-          <p:cNvPicPr>
-            <a:picLocks noGrp="1" noChangeAspect="1"/>
-          </p:cNvPicPr>
-          <p:nvPr>
-            <p:ph idx="1"/>
-          </p:nvPr>
-        </p:nvPicPr>
-        <p:blipFill>
-          <a:blip r:embed="rId2"/>
-          <a:stretch>
-            <a:fillRect/>
-          </a:stretch>
-        </p:blipFill>
-        <p:spPr>
-          <a:xfrm>
-            <a:off x="510867" y="1919518"/>
-            <a:ext cx="11170265" cy="4068328"/>
-          </a:xfrm>
-        </p:spPr>
-      </p:pic>
+          <a:bodyPr>
+            <a:normAutofit/>
+          </a:bodyPr>
+          <a:lstStyle/>
+          <a:p>
+            <a:pPr algn="ctr"/>
+            <a:r>
+              <a:rPr lang="en-US" sz="4400" dirty="0"/>
+              <a:t>RESULTS VISUALIZED!</a:t>
+            </a:r>
+            <a:endParaRPr lang="en-US" dirty="0"/>
+          </a:p>
+        </p:txBody>
+      </p:sp>
     </p:spTree>
     <p:extLst>
       <p:ext uri="{BB962C8B-B14F-4D97-AF65-F5344CB8AC3E}">
-        <p14:creationId xmlns:p14="http://schemas.microsoft.com/office/powerpoint/2010/main" val="210658953"/>
+        <p14:creationId xmlns:p14="http://schemas.microsoft.com/office/powerpoint/2010/main" val="2908359930"/>
       </p:ext>
     </p:extLst>
   </p:cSld>
@@ -12732,6 +12491,267 @@
     <p:extLst>
       <p:ext uri="{BB962C8B-B14F-4D97-AF65-F5344CB8AC3E}">
         <p14:creationId xmlns:p14="http://schemas.microsoft.com/office/powerpoint/2010/main" val="45147177"/>
+      </p:ext>
+    </p:extLst>
+  </p:cSld>
+  <p:clrMapOvr>
+    <a:masterClrMapping/>
+  </p:clrMapOvr>
+</p:sld>
+</file>
+
+<file path=ppt/slides/slide40.xml><?xml version="1.0" encoding="utf-8"?>
+<p:sld xmlns:a="http://schemas.openxmlformats.org/drawingml/2006/main" xmlns:r="http://schemas.openxmlformats.org/officeDocument/2006/relationships" xmlns:p="http://schemas.openxmlformats.org/presentationml/2006/main">
+  <p:cSld>
+    <p:spTree>
+      <p:nvGrpSpPr>
+        <p:cNvPr id="1" name="">
+          <a:extLst>
+            <a:ext uri="{FF2B5EF4-FFF2-40B4-BE49-F238E27FC236}">
+              <a16:creationId xmlns:a16="http://schemas.microsoft.com/office/drawing/2014/main" id="{5E96BD3B-E792-C61D-F4B4-201046B7F3E6}"/>
+            </a:ext>
+          </a:extLst>
+        </p:cNvPr>
+        <p:cNvGrpSpPr/>
+        <p:nvPr/>
+      </p:nvGrpSpPr>
+      <p:grpSpPr>
+        <a:xfrm>
+          <a:off x="0" y="0"/>
+          <a:ext cx="0" cy="0"/>
+          <a:chOff x="0" y="0"/>
+          <a:chExt cx="0" cy="0"/>
+        </a:xfrm>
+      </p:grpSpPr>
+      <p:sp>
+        <p:nvSpPr>
+          <p:cNvPr id="2" name="Title 1">
+            <a:extLst>
+              <a:ext uri="{FF2B5EF4-FFF2-40B4-BE49-F238E27FC236}">
+                <a16:creationId xmlns:a16="http://schemas.microsoft.com/office/drawing/2014/main" id="{42F003C0-1BEF-0FA7-B05A-2E7F19E64EE5}"/>
+              </a:ext>
+            </a:extLst>
+          </p:cNvPr>
+          <p:cNvSpPr>
+            <a:spLocks noGrp="1"/>
+          </p:cNvSpPr>
+          <p:nvPr>
+            <p:ph type="title"/>
+          </p:nvPr>
+        </p:nvSpPr>
+        <p:spPr>
+          <a:xfrm>
+            <a:off x="88489" y="365125"/>
+            <a:ext cx="6381137" cy="6084836"/>
+          </a:xfrm>
+        </p:spPr>
+        <p:txBody>
+          <a:bodyPr>
+            <a:normAutofit/>
+          </a:bodyPr>
+          <a:lstStyle/>
+          <a:p>
+            <a:pPr algn="ctr"/>
+            <a:r>
+              <a:rPr lang="en-US" sz="4400" dirty="0"/>
+              <a:t>Does the arthropod community change with grazing intensity?</a:t>
+            </a:r>
+            <a:br>
+              <a:rPr lang="en-US" sz="4400" dirty="0"/>
+            </a:br>
+            <a:br>
+              <a:rPr lang="en-US" sz="4400" dirty="0"/>
+            </a:br>
+            <a:r>
+              <a:rPr lang="en-US" sz="4400" dirty="0"/>
+              <a:t>NO!</a:t>
+            </a:r>
+            <a:endParaRPr lang="en-US" dirty="0"/>
+          </a:p>
+        </p:txBody>
+      </p:sp>
+      <p:pic>
+        <p:nvPicPr>
+          <p:cNvPr id="4" name="Picture 3" descr="A screenshot of a graph&#10;&#10;Description automatically generated">
+            <a:extLst>
+              <a:ext uri="{FF2B5EF4-FFF2-40B4-BE49-F238E27FC236}">
+                <a16:creationId xmlns:a16="http://schemas.microsoft.com/office/drawing/2014/main" id="{78F0BF66-49F5-AC98-73B6-F3B6A75C7185}"/>
+              </a:ext>
+            </a:extLst>
+          </p:cNvPr>
+          <p:cNvPicPr>
+            <a:picLocks noChangeAspect="1"/>
+          </p:cNvPicPr>
+          <p:nvPr/>
+        </p:nvPicPr>
+        <p:blipFill>
+          <a:blip r:embed="rId2"/>
+          <a:stretch>
+            <a:fillRect/>
+          </a:stretch>
+        </p:blipFill>
+        <p:spPr>
+          <a:xfrm>
+            <a:off x="6650293" y="365125"/>
+            <a:ext cx="5223388" cy="6268065"/>
+          </a:xfrm>
+          <a:prstGeom prst="rect">
+            <a:avLst/>
+          </a:prstGeom>
+        </p:spPr>
+      </p:pic>
+    </p:spTree>
+    <p:extLst>
+      <p:ext uri="{BB962C8B-B14F-4D97-AF65-F5344CB8AC3E}">
+        <p14:creationId xmlns:p14="http://schemas.microsoft.com/office/powerpoint/2010/main" val="884976370"/>
+      </p:ext>
+    </p:extLst>
+  </p:cSld>
+  <p:clrMapOvr>
+    <a:masterClrMapping/>
+  </p:clrMapOvr>
+</p:sld>
+</file>
+
+<file path=ppt/slides/slide41.xml><?xml version="1.0" encoding="utf-8"?>
+<p:sld xmlns:a="http://schemas.openxmlformats.org/drawingml/2006/main" xmlns:r="http://schemas.openxmlformats.org/officeDocument/2006/relationships" xmlns:p="http://schemas.openxmlformats.org/presentationml/2006/main">
+  <p:cSld>
+    <p:spTree>
+      <p:nvGrpSpPr>
+        <p:cNvPr id="1" name="">
+          <a:extLst>
+            <a:ext uri="{FF2B5EF4-FFF2-40B4-BE49-F238E27FC236}">
+              <a16:creationId xmlns:a16="http://schemas.microsoft.com/office/drawing/2014/main" id="{76219D6D-8078-214B-A299-A9A6227BBFEE}"/>
+            </a:ext>
+          </a:extLst>
+        </p:cNvPr>
+        <p:cNvGrpSpPr/>
+        <p:nvPr/>
+      </p:nvGrpSpPr>
+      <p:grpSpPr>
+        <a:xfrm>
+          <a:off x="0" y="0"/>
+          <a:ext cx="0" cy="0"/>
+          <a:chOff x="0" y="0"/>
+          <a:chExt cx="0" cy="0"/>
+        </a:xfrm>
+      </p:grpSpPr>
+      <p:sp>
+        <p:nvSpPr>
+          <p:cNvPr id="2" name="Title 1">
+            <a:extLst>
+              <a:ext uri="{FF2B5EF4-FFF2-40B4-BE49-F238E27FC236}">
+                <a16:creationId xmlns:a16="http://schemas.microsoft.com/office/drawing/2014/main" id="{7E90A886-0AF9-1931-155D-10E3269C6CA2}"/>
+              </a:ext>
+            </a:extLst>
+          </p:cNvPr>
+          <p:cNvSpPr>
+            <a:spLocks noGrp="1"/>
+          </p:cNvSpPr>
+          <p:nvPr>
+            <p:ph type="title"/>
+          </p:nvPr>
+        </p:nvSpPr>
+        <p:spPr>
+          <a:xfrm>
+            <a:off x="88489" y="365125"/>
+            <a:ext cx="6381137" cy="6084836"/>
+          </a:xfrm>
+        </p:spPr>
+        <p:txBody>
+          <a:bodyPr>
+            <a:normAutofit/>
+          </a:bodyPr>
+          <a:lstStyle/>
+          <a:p>
+            <a:pPr algn="ctr"/>
+            <a:r>
+              <a:rPr lang="en-US" sz="4400" dirty="0"/>
+              <a:t>Does the arthropod community change from year to year with grazing intensity?</a:t>
+            </a:r>
+            <a:br>
+              <a:rPr lang="en-US" sz="4400" dirty="0"/>
+            </a:br>
+            <a:br>
+              <a:rPr lang="en-US" sz="4400" dirty="0"/>
+            </a:br>
+            <a:r>
+              <a:rPr lang="en-US" sz="4400" dirty="0"/>
+              <a:t>YES - sometimes</a:t>
+            </a:r>
+            <a:endParaRPr lang="en-US" dirty="0"/>
+          </a:p>
+        </p:txBody>
+      </p:sp>
+      <p:pic>
+        <p:nvPicPr>
+          <p:cNvPr id="8" name="Picture 7" descr="A screenshot of a graph&#10;&#10;Description automatically generated">
+            <a:extLst>
+              <a:ext uri="{FF2B5EF4-FFF2-40B4-BE49-F238E27FC236}">
+                <a16:creationId xmlns:a16="http://schemas.microsoft.com/office/drawing/2014/main" id="{333A84D4-2D1F-124B-E537-C3D75511E102}"/>
+              </a:ext>
+            </a:extLst>
+          </p:cNvPr>
+          <p:cNvPicPr>
+            <a:picLocks noChangeAspect="1"/>
+          </p:cNvPicPr>
+          <p:nvPr/>
+        </p:nvPicPr>
+        <p:blipFill>
+          <a:blip r:embed="rId2"/>
+          <a:stretch>
+            <a:fillRect/>
+          </a:stretch>
+        </p:blipFill>
+        <p:spPr>
+          <a:xfrm>
+            <a:off x="6584624" y="64574"/>
+            <a:ext cx="5607376" cy="6728851"/>
+          </a:xfrm>
+          <a:prstGeom prst="rect">
+            <a:avLst/>
+          </a:prstGeom>
+        </p:spPr>
+      </p:pic>
+      <p:sp>
+        <p:nvSpPr>
+          <p:cNvPr id="15" name="TextBox 14">
+            <a:extLst>
+              <a:ext uri="{FF2B5EF4-FFF2-40B4-BE49-F238E27FC236}">
+                <a16:creationId xmlns:a16="http://schemas.microsoft.com/office/drawing/2014/main" id="{9F2426F3-2237-2C0C-ACF7-B6337DE1BAB8}"/>
+              </a:ext>
+            </a:extLst>
+          </p:cNvPr>
+          <p:cNvSpPr txBox="1"/>
+          <p:nvPr/>
+        </p:nvSpPr>
+        <p:spPr>
+          <a:xfrm>
+            <a:off x="1" y="5879691"/>
+            <a:ext cx="6381138" cy="923330"/>
+          </a:xfrm>
+          <a:prstGeom prst="rect">
+            <a:avLst/>
+          </a:prstGeom>
+          <a:noFill/>
+        </p:spPr>
+        <p:txBody>
+          <a:bodyPr wrap="square" rtlCol="0">
+            <a:spAutoFit/>
+          </a:bodyPr>
+          <a:lstStyle/>
+          <a:p>
+            <a:r>
+              <a:rPr lang="en-US" dirty="0"/>
+              <a:t>Note: here you would want to decide whether to graph just year to year differences or year &amp; grazing differences then put stats on the figure</a:t>
+            </a:r>
+          </a:p>
+        </p:txBody>
+      </p:sp>
+    </p:spTree>
+    <p:extLst>
+      <p:ext uri="{BB962C8B-B14F-4D97-AF65-F5344CB8AC3E}">
+        <p14:creationId xmlns:p14="http://schemas.microsoft.com/office/powerpoint/2010/main" val="2417115884"/>
       </p:ext>
     </p:extLst>
   </p:cSld>

</xml_diff>